<commit_message>
[WR A] presentazione application
</commit_message>
<xml_diff>
--- a/Presentazione/Atsilo1/D'Eugenio/Atsilo_A_DEugenioElisa.pptx
+++ b/Presentazione/Atsilo1/D'Eugenio/Atsilo_A_DEugenioElisa.pptx
@@ -5,7 +5,7 @@
     <p:sldMasterId id="2147483684" r:id="rId1"/>
   </p:sldMasterIdLst>
   <p:notesMasterIdLst>
-    <p:notesMasterId r:id="rId12"/>
+    <p:notesMasterId r:id="rId21"/>
   </p:notesMasterIdLst>
   <p:sldIdLst>
     <p:sldId id="256" r:id="rId2"/>
@@ -13,11 +13,20 @@
     <p:sldId id="260" r:id="rId4"/>
     <p:sldId id="265" r:id="rId5"/>
     <p:sldId id="261" r:id="rId6"/>
-    <p:sldId id="266" r:id="rId7"/>
+    <p:sldId id="273" r:id="rId7"/>
     <p:sldId id="262" r:id="rId8"/>
-    <p:sldId id="267" r:id="rId9"/>
-    <p:sldId id="268" r:id="rId10"/>
-    <p:sldId id="264" r:id="rId11"/>
+    <p:sldId id="274" r:id="rId9"/>
+    <p:sldId id="266" r:id="rId10"/>
+    <p:sldId id="267" r:id="rId11"/>
+    <p:sldId id="269" r:id="rId12"/>
+    <p:sldId id="270" r:id="rId13"/>
+    <p:sldId id="271" r:id="rId14"/>
+    <p:sldId id="272" r:id="rId15"/>
+    <p:sldId id="275" r:id="rId16"/>
+    <p:sldId id="276" r:id="rId17"/>
+    <p:sldId id="277" r:id="rId18"/>
+    <p:sldId id="278" r:id="rId19"/>
+    <p:sldId id="279" r:id="rId20"/>
   </p:sldIdLst>
   <p:sldSz cx="9144000" cy="6858000" type="screen4x3"/>
   <p:notesSz cx="6858000" cy="9144000"/>
@@ -202,7 +211,7 @@
             <a:fld id="{38D78F4D-402C-46E0-A4BB-DF91EA86B14C}" type="datetimeFigureOut">
               <a:rPr lang="it-IT" smtClean="0"/>
               <a:pPr/>
-              <a:t>27/12/2012</a:t>
+              <a:t>28/12/2012</a:t>
             </a:fld>
             <a:endParaRPr lang="it-IT"/>
           </a:p>
@@ -371,7 +380,7 @@
     </p:spTree>
     <p:extLst>
       <p:ext uri="{BB962C8B-B14F-4D97-AF65-F5344CB8AC3E}">
-        <p14:creationId xmlns:p14="http://schemas.microsoft.com/office/powerpoint/2010/main" xmlns="" val="2126419590"/>
+        <p14:creationId xmlns="" xmlns:p14="http://schemas.microsoft.com/office/powerpoint/2010/main" val="2126419590"/>
       </p:ext>
     </p:extLst>
   </p:cSld>
@@ -637,7 +646,7 @@
             <a:fld id="{63CABBC0-75E4-43BB-A6A6-84C2A96BDB82}" type="datetimeFigureOut">
               <a:rPr lang="it-IT" smtClean="0"/>
               <a:pPr/>
-              <a:t>27/12/2012</a:t>
+              <a:t>28/12/2012</a:t>
             </a:fld>
             <a:endParaRPr lang="it-IT"/>
           </a:p>
@@ -819,7 +828,7 @@
             <a:fld id="{63CABBC0-75E4-43BB-A6A6-84C2A96BDB82}" type="datetimeFigureOut">
               <a:rPr lang="it-IT" smtClean="0"/>
               <a:pPr/>
-              <a:t>27/12/2012</a:t>
+              <a:t>28/12/2012</a:t>
             </a:fld>
             <a:endParaRPr lang="it-IT"/>
           </a:p>
@@ -1011,7 +1020,7 @@
             <a:fld id="{63CABBC0-75E4-43BB-A6A6-84C2A96BDB82}" type="datetimeFigureOut">
               <a:rPr lang="it-IT" smtClean="0"/>
               <a:pPr/>
-              <a:t>27/12/2012</a:t>
+              <a:t>28/12/2012</a:t>
             </a:fld>
             <a:endParaRPr lang="it-IT"/>
           </a:p>
@@ -1193,7 +1202,7 @@
             <a:fld id="{63CABBC0-75E4-43BB-A6A6-84C2A96BDB82}" type="datetimeFigureOut">
               <a:rPr lang="it-IT" smtClean="0"/>
               <a:pPr/>
-              <a:t>27/12/2012</a:t>
+              <a:t>28/12/2012</a:t>
             </a:fld>
             <a:endParaRPr lang="it-IT"/>
           </a:p>
@@ -1436,7 +1445,7 @@
             <a:fld id="{63CABBC0-75E4-43BB-A6A6-84C2A96BDB82}" type="datetimeFigureOut">
               <a:rPr lang="it-IT" smtClean="0"/>
               <a:pPr/>
-              <a:t>27/12/2012</a:t>
+              <a:t>28/12/2012</a:t>
             </a:fld>
             <a:endParaRPr lang="it-IT"/>
           </a:p>
@@ -1717,7 +1726,7 @@
             <a:fld id="{63CABBC0-75E4-43BB-A6A6-84C2A96BDB82}" type="datetimeFigureOut">
               <a:rPr lang="it-IT" smtClean="0"/>
               <a:pPr/>
-              <a:t>27/12/2012</a:t>
+              <a:t>28/12/2012</a:t>
             </a:fld>
             <a:endParaRPr lang="it-IT"/>
           </a:p>
@@ -2108,7 +2117,7 @@
             <a:fld id="{63CABBC0-75E4-43BB-A6A6-84C2A96BDB82}" type="datetimeFigureOut">
               <a:rPr lang="it-IT" smtClean="0"/>
               <a:pPr/>
-              <a:t>27/12/2012</a:t>
+              <a:t>28/12/2012</a:t>
             </a:fld>
             <a:endParaRPr lang="it-IT"/>
           </a:p>
@@ -2267,7 +2276,7 @@
             <a:fld id="{63CABBC0-75E4-43BB-A6A6-84C2A96BDB82}" type="datetimeFigureOut">
               <a:rPr lang="it-IT" smtClean="0"/>
               <a:pPr/>
-              <a:t>27/12/2012</a:t>
+              <a:t>28/12/2012</a:t>
             </a:fld>
             <a:endParaRPr lang="it-IT"/>
           </a:p>
@@ -2366,7 +2375,7 @@
             <a:fld id="{63CABBC0-75E4-43BB-A6A6-84C2A96BDB82}" type="datetimeFigureOut">
               <a:rPr lang="it-IT" smtClean="0"/>
               <a:pPr/>
-              <a:t>27/12/2012</a:t>
+              <a:t>28/12/2012</a:t>
             </a:fld>
             <a:endParaRPr lang="it-IT"/>
           </a:p>
@@ -2636,7 +2645,7 @@
             <a:fld id="{63CABBC0-75E4-43BB-A6A6-84C2A96BDB82}" type="datetimeFigureOut">
               <a:rPr lang="it-IT" smtClean="0"/>
               <a:pPr/>
-              <a:t>27/12/2012</a:t>
+              <a:t>28/12/2012</a:t>
             </a:fld>
             <a:endParaRPr lang="it-IT"/>
           </a:p>
@@ -2933,7 +2942,7 @@
             <a:fld id="{63CABBC0-75E4-43BB-A6A6-84C2A96BDB82}" type="datetimeFigureOut">
               <a:rPr lang="it-IT" smtClean="0"/>
               <a:pPr/>
-              <a:t>27/12/2012</a:t>
+              <a:t>28/12/2012</a:t>
             </a:fld>
             <a:endParaRPr lang="it-IT"/>
           </a:p>
@@ -3713,7 +3722,7 @@
             <a:fld id="{63CABBC0-75E4-43BB-A6A6-84C2A96BDB82}" type="datetimeFigureOut">
               <a:rPr lang="it-IT" smtClean="0"/>
               <a:pPr/>
-              <a:t>27/12/2012</a:t>
+              <a:t>28/12/2012</a:t>
             </a:fld>
             <a:endParaRPr lang="it-IT"/>
           </a:p>
@@ -4396,7 +4405,7 @@
           <p:nvPr>
             <p:extLst>
               <p:ext uri="{D42A27DB-BD31-4B8C-83A1-F6EECF244321}">
-                <p14:modId xmlns:p14="http://schemas.microsoft.com/office/powerpoint/2010/main" xmlns="" val="3478576524"/>
+                <p14:modId xmlns="" xmlns:p14="http://schemas.microsoft.com/office/powerpoint/2010/main" val="3478576524"/>
               </p:ext>
             </p:extLst>
           </p:nvPr>
@@ -4520,14 +4529,14 @@
           <p:nvPr>
             <p:extLst>
               <p:ext uri="{D42A27DB-BD31-4B8C-83A1-F6EECF244321}">
-                <p14:modId xmlns:p14="http://schemas.microsoft.com/office/powerpoint/2010/main" xmlns="" val="956586736"/>
+                <p14:modId xmlns="" xmlns:p14="http://schemas.microsoft.com/office/powerpoint/2010/main" val="956586736"/>
               </p:ext>
             </p:extLst>
           </p:nvPr>
         </p:nvGraphicFramePr>
         <p:xfrm>
           <a:off x="7092280" y="6060793"/>
-          <a:ext cx="2051720" cy="792480"/>
+          <a:ext cx="2051720" cy="726314"/>
         </p:xfrm>
         <a:graphic>
           <a:graphicData uri="http://schemas.openxmlformats.org/drawingml/2006/table">
@@ -4610,7 +4619,7 @@
           <a:blip r:embed="rId2" cstate="print">
             <a:extLst>
               <a:ext uri="{28A0092B-C50C-407E-A947-70E740481C1C}">
-                <a14:useLocalDpi xmlns:a14="http://schemas.microsoft.com/office/drawing/2010/main" xmlns="" val="0"/>
+                <a14:useLocalDpi xmlns="" xmlns:a14="http://schemas.microsoft.com/office/drawing/2010/main" val="0"/>
               </a:ext>
             </a:extLst>
           </a:blip>
@@ -4630,7 +4639,7 @@
           <a:noFill/>
           <a:extLst>
             <a:ext uri="{909E8E84-426E-40DD-AFC4-6F175D3DCCD1}">
-              <a14:hiddenFill xmlns:a14="http://schemas.microsoft.com/office/drawing/2010/main" xmlns="">
+              <a14:hiddenFill xmlns="" xmlns:a14="http://schemas.microsoft.com/office/drawing/2010/main">
                 <a:solidFill>
                   <a:srgbClr val="FFFFFF"/>
                 </a:solidFill>
@@ -4642,7 +4651,7 @@
     </p:spTree>
     <p:extLst>
       <p:ext uri="{BB962C8B-B14F-4D97-AF65-F5344CB8AC3E}">
-        <p14:creationId xmlns:p14="http://schemas.microsoft.com/office/powerpoint/2010/main" xmlns="" val="4165334171"/>
+        <p14:creationId xmlns="" xmlns:p14="http://schemas.microsoft.com/office/powerpoint/2010/main" val="4165334171"/>
       </p:ext>
     </p:extLst>
   </p:cSld>
@@ -4684,8 +4693,8 @@
         </p:nvSpPr>
         <p:spPr>
           <a:xfrm>
-            <a:off x="3767542" y="476672"/>
-            <a:ext cx="1923860" cy="1538883"/>
+            <a:off x="3058022" y="476672"/>
+            <a:ext cx="3342903" cy="1538883"/>
           </a:xfrm>
           <a:prstGeom prst="rect">
             <a:avLst/>
@@ -4700,19 +4709,28 @@
           <a:p>
             <a:pPr algn="ctr"/>
             <a:r>
-              <a:rPr lang="it-IT" sz="4800" b="1" dirty="0" smtClean="0">
+              <a:rPr lang="it-IT" sz="4800" b="1" dirty="0" err="1" smtClean="0">
                 <a:latin typeface="+mj-lt"/>
               </a:rPr>
-              <a:t>Titolo </a:t>
-            </a:r>
+              <a:t>Applications</a:t>
+            </a:r>
+            <a:endParaRPr lang="it-IT" sz="4800" b="1" dirty="0" smtClean="0">
+              <a:latin typeface="+mj-lt"/>
+            </a:endParaRPr>
           </a:p>
           <a:p>
             <a:pPr algn="ctr"/>
+            <a:r>
+              <a:rPr lang="it-IT" sz="2800" b="1" dirty="0" err="1" smtClean="0">
+                <a:latin typeface="+mj-lt"/>
+              </a:rPr>
+              <a:t>Step</a:t>
+            </a:r>
             <a:r>
               <a:rPr lang="it-IT" sz="2800" b="1" dirty="0" smtClean="0">
                 <a:latin typeface="+mj-lt"/>
               </a:rPr>
-              <a:t>Sotto Titolo</a:t>
+              <a:t> Iscrizione</a:t>
             </a:r>
           </a:p>
           <a:p>
@@ -4733,8 +4751,8 @@
         </p:nvSpPr>
         <p:spPr>
           <a:xfrm>
-            <a:off x="311099" y="2972216"/>
-            <a:ext cx="5111750" cy="2353728"/>
+            <a:off x="251520" y="1988840"/>
+            <a:ext cx="8424936" cy="4248472"/>
           </a:xfrm>
           <a:prstGeom prst="rect">
             <a:avLst/>
@@ -4905,37 +4923,2788 @@
           <a:p>
             <a:r>
               <a:rPr lang="it-IT" dirty="0" smtClean="0"/>
-              <a:t>Primo livello</a:t>
+              <a:t>Solo dopo aver completato gli </a:t>
+            </a:r>
+            <a:r>
+              <a:rPr lang="it-IT" dirty="0" err="1" smtClean="0"/>
+              <a:t>step</a:t>
+            </a:r>
+            <a:r>
+              <a:rPr lang="it-IT" dirty="0" smtClean="0"/>
+              <a:t> dell’iscrizione è possibile presentare una </a:t>
+            </a:r>
+            <a:r>
+              <a:rPr lang="it-IT" b="1" dirty="0" smtClean="0"/>
+              <a:t>domanda di iscrizione,  </a:t>
+            </a:r>
+            <a:r>
+              <a:rPr lang="it-IT" dirty="0" smtClean="0"/>
+              <a:t>di un bambino all’asilo, divisa in due fasi:</a:t>
             </a:r>
           </a:p>
           <a:p>
             <a:pPr lvl="1"/>
             <a:r>
               <a:rPr lang="it-IT" dirty="0" smtClean="0"/>
-              <a:t>Secondo livello</a:t>
-            </a:r>
-          </a:p>
-          <a:p>
-            <a:pPr lvl="2"/>
+              <a:t>La </a:t>
+            </a:r>
+            <a:r>
+              <a:rPr lang="it-IT" b="1" dirty="0" smtClean="0"/>
+              <a:t>prima fase </a:t>
+            </a:r>
             <a:r>
               <a:rPr lang="it-IT" dirty="0" smtClean="0"/>
-              <a:t>Terzo livello</a:t>
-            </a:r>
-          </a:p>
-          <a:p>
-            <a:pPr lvl="3"/>
+              <a:t>viene effettuata </a:t>
+            </a:r>
+            <a:r>
+              <a:rPr lang="it-IT" b="1" dirty="0" smtClean="0"/>
+              <a:t>prima</a:t>
+            </a:r>
             <a:r>
               <a:rPr lang="it-IT" dirty="0" smtClean="0"/>
-              <a:t>Quarto livello</a:t>
-            </a:r>
-          </a:p>
-          <a:p>
-            <a:pPr lvl="4"/>
+              <a:t> della pubblicazione delle graduatorie, quando il bando è ancora aperto</a:t>
+            </a:r>
+          </a:p>
+          <a:p>
+            <a:pPr lvl="1"/>
             <a:r>
               <a:rPr lang="it-IT" dirty="0" smtClean="0"/>
-              <a:t>Quinto livello</a:t>
-            </a:r>
+              <a:t>La </a:t>
+            </a:r>
+            <a:r>
+              <a:rPr lang="it-IT" b="1" dirty="0" smtClean="0"/>
+              <a:t>seconda fase </a:t>
+            </a:r>
+            <a:r>
+              <a:rPr lang="it-IT" dirty="0" smtClean="0"/>
+              <a:t>viene effettuata </a:t>
+            </a:r>
+            <a:r>
+              <a:rPr lang="it-IT" b="1" dirty="0" smtClean="0"/>
+              <a:t>dopo</a:t>
+            </a:r>
+            <a:r>
+              <a:rPr lang="it-IT" dirty="0" smtClean="0"/>
+              <a:t> la pubblicazione delle graduatorie, per inserire i dati che servono a completare la domanda di iscrizione</a:t>
+            </a:r>
+          </a:p>
+          <a:p>
+            <a:pPr marL="0" lvl="1">
+              <a:spcBef>
+                <a:spcPts val="0"/>
+              </a:spcBef>
+              <a:buNone/>
+            </a:pPr>
+            <a:r>
+              <a:rPr lang="it-IT" dirty="0" smtClean="0"/>
+              <a:t>E possibile, inoltre, conoscerne lo </a:t>
+            </a:r>
+            <a:r>
+              <a:rPr lang="it-IT" b="1" dirty="0" smtClean="0"/>
+              <a:t>stato</a:t>
+            </a:r>
+            <a:r>
+              <a:rPr lang="it-IT" dirty="0" smtClean="0"/>
+              <a:t> per avere sempre un feedback riguardo la situazione di una domanda di iscrizione</a:t>
+            </a:r>
+          </a:p>
+        </p:txBody>
+      </p:sp>
+    </p:spTree>
+    <p:extLst>
+      <p:ext uri="{BB962C8B-B14F-4D97-AF65-F5344CB8AC3E}">
+        <p14:creationId xmlns="" xmlns:p14="http://schemas.microsoft.com/office/powerpoint/2010/main" val="155874689"/>
+      </p:ext>
+    </p:extLst>
+  </p:cSld>
+  <p:clrMapOvr>
+    <a:masterClrMapping/>
+  </p:clrMapOvr>
+  <mc:AlternateContent xmlns:mc="http://schemas.openxmlformats.org/markup-compatibility/2006">
+    <mc:Choice xmlns="" xmlns:p14="http://schemas.microsoft.com/office/powerpoint/2010/main" Requires="p14">
+      <p:transition spd="slow" p14:dur="2000"/>
+    </mc:Choice>
+    <mc:Fallback>
+      <p:transition spd="slow"/>
+    </mc:Fallback>
+  </mc:AlternateContent>
+  <p:timing>
+    <p:tnLst>
+      <p:par>
+        <p:cTn id="1" dur="indefinite" restart="never" nodeType="tmRoot"/>
+      </p:par>
+    </p:tnLst>
+  </p:timing>
+</p:sld>
+</file>
+
+<file path=ppt/slides/slide11.xml><?xml version="1.0" encoding="utf-8"?>
+<p:sld xmlns:a="http://schemas.openxmlformats.org/drawingml/2006/main" xmlns:r="http://schemas.openxmlformats.org/officeDocument/2006/relationships" xmlns:p="http://schemas.openxmlformats.org/presentationml/2006/main">
+  <p:cSld>
+    <p:spTree>
+      <p:nvGrpSpPr>
+        <p:cNvPr id="1" name=""/>
+        <p:cNvGrpSpPr/>
+        <p:nvPr/>
+      </p:nvGrpSpPr>
+      <p:grpSpPr>
+        <a:xfrm>
+          <a:off x="0" y="0"/>
+          <a:ext cx="0" cy="0"/>
+          <a:chOff x="0" y="0"/>
+          <a:chExt cx="0" cy="0"/>
+        </a:xfrm>
+      </p:grpSpPr>
+      <p:sp>
+        <p:nvSpPr>
+          <p:cNvPr id="2" name="CasellaDiTesto 1"/>
+          <p:cNvSpPr txBox="1"/>
+          <p:nvPr/>
+        </p:nvSpPr>
+        <p:spPr>
+          <a:xfrm>
+            <a:off x="3110921" y="476672"/>
+            <a:ext cx="3237105" cy="1538883"/>
+          </a:xfrm>
+          <a:prstGeom prst="rect">
+            <a:avLst/>
+          </a:prstGeom>
+          <a:noFill/>
+        </p:spPr>
+        <p:txBody>
+          <a:bodyPr wrap="none" rtlCol="0">
+            <a:spAutoFit/>
+          </a:bodyPr>
+          <a:lstStyle/>
+          <a:p>
+            <a:pPr algn="ctr"/>
+            <a:r>
+              <a:rPr lang="it-IT" sz="4800" b="1" dirty="0" err="1" smtClean="0">
+                <a:latin typeface="+mj-lt"/>
+              </a:rPr>
+              <a:t>Application</a:t>
+            </a:r>
+            <a:r>
+              <a:rPr lang="it-IT" sz="4800" b="1" dirty="0" smtClean="0">
+                <a:latin typeface="+mj-lt"/>
+              </a:rPr>
+              <a:t> </a:t>
+            </a:r>
+          </a:p>
+          <a:p>
+            <a:pPr algn="ctr"/>
+            <a:r>
+              <a:rPr lang="it-IT" sz="2800" b="1" dirty="0" err="1" smtClean="0">
+                <a:latin typeface="+mj-lt"/>
+              </a:rPr>
+              <a:t>Control</a:t>
+            </a:r>
+            <a:r>
+              <a:rPr lang="it-IT" sz="2800" b="1" dirty="0" smtClean="0">
+                <a:latin typeface="+mj-lt"/>
+              </a:rPr>
+              <a:t> Iscritti</a:t>
+            </a:r>
+            <a:endParaRPr lang="it-IT" sz="2800" b="1" dirty="0" smtClean="0">
+              <a:latin typeface="+mj-lt"/>
+            </a:endParaRPr>
+          </a:p>
+          <a:p>
+            <a:pPr algn="ctr"/>
+            <a:endParaRPr lang="it-IT" dirty="0">
+              <a:latin typeface="+mj-lt"/>
+            </a:endParaRPr>
+          </a:p>
+        </p:txBody>
+      </p:sp>
+      <p:sp>
+        <p:nvSpPr>
+          <p:cNvPr id="4" name="Content Placeholder 3"/>
+          <p:cNvSpPr txBox="1">
+            <a:spLocks/>
+          </p:cNvSpPr>
+          <p:nvPr/>
+        </p:nvSpPr>
+        <p:spPr>
+          <a:xfrm>
+            <a:off x="539552" y="2420888"/>
+            <a:ext cx="8208912" cy="3865896"/>
+          </a:xfrm>
+          <a:prstGeom prst="rect">
+            <a:avLst/>
+          </a:prstGeom>
+        </p:spPr>
+        <p:txBody>
+          <a:bodyPr tIns="0"/>
+          <a:lstStyle>
+            <a:lvl1pPr marL="274320" indent="-274320" algn="l" rtl="0" eaLnBrk="1" latinLnBrk="0" hangingPunct="1">
+              <a:spcBef>
+                <a:spcPct val="20000"/>
+              </a:spcBef>
+              <a:buClrTx/>
+              <a:buSzPct val="95000"/>
+              <a:buFont typeface="Wingdings" pitchFamily="2" charset="2"/>
+              <a:buChar char="v"/>
+              <a:defRPr kumimoji="0" sz="2800" kern="1200">
+                <a:solidFill>
+                  <a:schemeClr val="tx1"/>
+                </a:solidFill>
+                <a:latin typeface="+mn-lt"/>
+                <a:ea typeface="+mn-ea"/>
+                <a:cs typeface="+mn-cs"/>
+              </a:defRPr>
+            </a:lvl1pPr>
+            <a:lvl2pPr marL="640080" indent="-246888" algn="l" rtl="0" eaLnBrk="1" latinLnBrk="0" hangingPunct="1">
+              <a:spcBef>
+                <a:spcPct val="20000"/>
+              </a:spcBef>
+              <a:buClrTx/>
+              <a:buSzPct val="85000"/>
+              <a:buFont typeface="Courier New" pitchFamily="49" charset="0"/>
+              <a:buChar char="o"/>
+              <a:defRPr kumimoji="0" sz="2600" kern="1200">
+                <a:solidFill>
+                  <a:schemeClr val="tx1"/>
+                </a:solidFill>
+                <a:latin typeface="+mn-lt"/>
+                <a:ea typeface="+mn-ea"/>
+                <a:cs typeface="+mn-cs"/>
+              </a:defRPr>
+            </a:lvl2pPr>
+            <a:lvl3pPr marL="914400" indent="-246888" algn="l" rtl="0" eaLnBrk="1" latinLnBrk="0" hangingPunct="1">
+              <a:spcBef>
+                <a:spcPct val="20000"/>
+              </a:spcBef>
+              <a:buClrTx/>
+              <a:buSzPct val="70000"/>
+              <a:buFont typeface="Wingdings 2"/>
+              <a:buChar char=""/>
+              <a:defRPr kumimoji="0" sz="2400" kern="1200">
+                <a:solidFill>
+                  <a:schemeClr val="tx1"/>
+                </a:solidFill>
+                <a:latin typeface="+mn-lt"/>
+                <a:ea typeface="+mn-ea"/>
+                <a:cs typeface="+mn-cs"/>
+              </a:defRPr>
+            </a:lvl3pPr>
+            <a:lvl4pPr marL="1188720" indent="-210312" algn="l" rtl="0" eaLnBrk="1" latinLnBrk="0" hangingPunct="1">
+              <a:spcBef>
+                <a:spcPct val="20000"/>
+              </a:spcBef>
+              <a:buClrTx/>
+              <a:buSzPct val="65000"/>
+              <a:buFont typeface="Wingdings 2"/>
+              <a:buChar char=""/>
+              <a:defRPr kumimoji="0" sz="2000" kern="1200">
+                <a:solidFill>
+                  <a:schemeClr val="tx1"/>
+                </a:solidFill>
+                <a:latin typeface="+mn-lt"/>
+                <a:ea typeface="+mn-ea"/>
+                <a:cs typeface="+mn-cs"/>
+              </a:defRPr>
+            </a:lvl4pPr>
+            <a:lvl5pPr marL="1463040" indent="-210312" algn="l" rtl="0" eaLnBrk="1" latinLnBrk="0" hangingPunct="1">
+              <a:spcBef>
+                <a:spcPct val="20000"/>
+              </a:spcBef>
+              <a:buClrTx/>
+              <a:buSzPct val="65000"/>
+              <a:buFont typeface="Wingdings 2"/>
+              <a:buChar char=""/>
+              <a:defRPr kumimoji="0" sz="1800" kern="1200">
+                <a:solidFill>
+                  <a:schemeClr val="tx1"/>
+                </a:solidFill>
+                <a:latin typeface="+mn-lt"/>
+                <a:ea typeface="+mn-ea"/>
+                <a:cs typeface="+mn-cs"/>
+              </a:defRPr>
+            </a:lvl5pPr>
+            <a:lvl6pPr marL="1737360" indent="-210312" algn="l" rtl="0" eaLnBrk="1" latinLnBrk="0" hangingPunct="1">
+              <a:spcBef>
+                <a:spcPct val="20000"/>
+              </a:spcBef>
+              <a:buClr>
+                <a:schemeClr val="accent5"/>
+              </a:buClr>
+              <a:buSzPct val="80000"/>
+              <a:buFont typeface="Wingdings 2"/>
+              <a:buChar char=""/>
+              <a:defRPr kumimoji="0" sz="1800" kern="1200">
+                <a:solidFill>
+                  <a:schemeClr val="tx1"/>
+                </a:solidFill>
+                <a:latin typeface="+mn-lt"/>
+                <a:ea typeface="+mn-ea"/>
+                <a:cs typeface="+mn-cs"/>
+              </a:defRPr>
+            </a:lvl6pPr>
+            <a:lvl7pPr marL="1920240" indent="-182880" algn="l" rtl="0" eaLnBrk="1" latinLnBrk="0" hangingPunct="1">
+              <a:spcBef>
+                <a:spcPct val="20000"/>
+              </a:spcBef>
+              <a:buClr>
+                <a:schemeClr val="accent6"/>
+              </a:buClr>
+              <a:buSzPct val="80000"/>
+              <a:buFont typeface="Wingdings 2"/>
+              <a:buChar char=""/>
+              <a:defRPr kumimoji="0" sz="1600" kern="1200" baseline="0">
+                <a:solidFill>
+                  <a:schemeClr val="tx1"/>
+                </a:solidFill>
+                <a:latin typeface="+mn-lt"/>
+                <a:ea typeface="+mn-ea"/>
+                <a:cs typeface="+mn-cs"/>
+              </a:defRPr>
+            </a:lvl7pPr>
+            <a:lvl8pPr marL="2194560" indent="-182880" algn="l" rtl="0" eaLnBrk="1" latinLnBrk="0" hangingPunct="1">
+              <a:spcBef>
+                <a:spcPct val="20000"/>
+              </a:spcBef>
+              <a:buClr>
+                <a:schemeClr val="tx2"/>
+              </a:buClr>
+              <a:buChar char="•"/>
+              <a:defRPr kumimoji="0" sz="1600" kern="1200">
+                <a:solidFill>
+                  <a:schemeClr val="tx1"/>
+                </a:solidFill>
+                <a:latin typeface="+mn-lt"/>
+                <a:ea typeface="+mn-ea"/>
+                <a:cs typeface="+mn-cs"/>
+              </a:defRPr>
+            </a:lvl8pPr>
+            <a:lvl9pPr marL="2468880" indent="-182880" algn="l" rtl="0" eaLnBrk="1" latinLnBrk="0" hangingPunct="1">
+              <a:spcBef>
+                <a:spcPct val="20000"/>
+              </a:spcBef>
+              <a:buClr>
+                <a:schemeClr val="tx2"/>
+              </a:buClr>
+              <a:buFontTx/>
+              <a:buChar char="•"/>
+              <a:defRPr kumimoji="0" sz="1400" kern="1200" baseline="0">
+                <a:solidFill>
+                  <a:schemeClr val="tx1"/>
+                </a:solidFill>
+                <a:latin typeface="+mn-lt"/>
+                <a:ea typeface="+mn-ea"/>
+                <a:cs typeface="+mn-cs"/>
+              </a:defRPr>
+            </a:lvl9pPr>
+          </a:lstStyle>
+          <a:p>
+            <a:pPr marL="0" indent="0">
+              <a:buNone/>
+            </a:pPr>
+            <a:r>
+              <a:rPr lang="it-IT" dirty="0" smtClean="0"/>
+              <a:t>Il </a:t>
+            </a:r>
+            <a:r>
+              <a:rPr lang="it-IT" b="1" dirty="0" err="1" smtClean="0"/>
+              <a:t>Control</a:t>
+            </a:r>
+            <a:r>
+              <a:rPr lang="it-IT" b="1" dirty="0" smtClean="0"/>
+              <a:t> Iscritti </a:t>
+            </a:r>
+            <a:r>
+              <a:rPr lang="it-IT" dirty="0" smtClean="0"/>
+              <a:t>si occupa di gestire alcune ricerche prestabilite per consultare velocemente </a:t>
+            </a:r>
+            <a:r>
+              <a:rPr lang="it-IT" b="1" dirty="0" smtClean="0"/>
+              <a:t>categorie di bambini</a:t>
+            </a:r>
+            <a:r>
+              <a:rPr lang="it-IT" dirty="0" smtClean="0"/>
+              <a:t> con le relative domande di iscrizione: idonei, non idonei, al primo anno, ad anni successivi</a:t>
+            </a:r>
+            <a:r>
+              <a:rPr lang="it-IT" dirty="0" smtClean="0"/>
+              <a:t> </a:t>
+            </a:r>
+            <a:r>
+              <a:rPr lang="it-IT" dirty="0" smtClean="0"/>
+              <a:t>e all’ultimo anno. </a:t>
+            </a:r>
+            <a:endParaRPr lang="en-US" dirty="0" smtClean="0"/>
+          </a:p>
+          <a:p>
+            <a:pPr marL="0" indent="0">
+              <a:buNone/>
+            </a:pPr>
             <a:endParaRPr lang="en-US" dirty="0"/>
+          </a:p>
+        </p:txBody>
+      </p:sp>
+    </p:spTree>
+    <p:extLst>
+      <p:ext uri="{BB962C8B-B14F-4D97-AF65-F5344CB8AC3E}">
+        <p14:creationId xmlns="" xmlns:p14="http://schemas.microsoft.com/office/powerpoint/2010/main" val="155874689"/>
+      </p:ext>
+    </p:extLst>
+  </p:cSld>
+  <p:clrMapOvr>
+    <a:masterClrMapping/>
+  </p:clrMapOvr>
+  <mc:AlternateContent xmlns:mc="http://schemas.openxmlformats.org/markup-compatibility/2006">
+    <mc:Choice xmlns="" xmlns:p14="http://schemas.microsoft.com/office/powerpoint/2010/main" Requires="p14">
+      <p:transition spd="slow" p14:dur="2000"/>
+    </mc:Choice>
+    <mc:Fallback>
+      <p:transition spd="slow"/>
+    </mc:Fallback>
+  </mc:AlternateContent>
+  <p:timing>
+    <p:tnLst>
+      <p:par>
+        <p:cTn id="1" dur="indefinite" restart="never" nodeType="tmRoot"/>
+      </p:par>
+    </p:tnLst>
+  </p:timing>
+</p:sld>
+</file>
+
+<file path=ppt/slides/slide12.xml><?xml version="1.0" encoding="utf-8"?>
+<p:sld xmlns:a="http://schemas.openxmlformats.org/drawingml/2006/main" xmlns:r="http://schemas.openxmlformats.org/officeDocument/2006/relationships" xmlns:p="http://schemas.openxmlformats.org/presentationml/2006/main">
+  <p:cSld>
+    <p:spTree>
+      <p:nvGrpSpPr>
+        <p:cNvPr id="1" name=""/>
+        <p:cNvGrpSpPr/>
+        <p:nvPr/>
+      </p:nvGrpSpPr>
+      <p:grpSpPr>
+        <a:xfrm>
+          <a:off x="0" y="0"/>
+          <a:ext cx="0" cy="0"/>
+          <a:chOff x="0" y="0"/>
+          <a:chExt cx="0" cy="0"/>
+        </a:xfrm>
+      </p:grpSpPr>
+      <p:sp>
+        <p:nvSpPr>
+          <p:cNvPr id="2" name="CasellaDiTesto 1"/>
+          <p:cNvSpPr txBox="1"/>
+          <p:nvPr/>
+        </p:nvSpPr>
+        <p:spPr>
+          <a:xfrm>
+            <a:off x="2608254" y="476672"/>
+            <a:ext cx="4242443" cy="1538883"/>
+          </a:xfrm>
+          <a:prstGeom prst="rect">
+            <a:avLst/>
+          </a:prstGeom>
+          <a:noFill/>
+        </p:spPr>
+        <p:txBody>
+          <a:bodyPr wrap="none" rtlCol="0">
+            <a:spAutoFit/>
+          </a:bodyPr>
+          <a:lstStyle/>
+          <a:p>
+            <a:pPr algn="ctr"/>
+            <a:r>
+              <a:rPr lang="it-IT" sz="4800" b="1" dirty="0" err="1" smtClean="0">
+                <a:latin typeface="+mj-lt"/>
+              </a:rPr>
+              <a:t>Application</a:t>
+            </a:r>
+            <a:r>
+              <a:rPr lang="it-IT" sz="4800" b="1" dirty="0" smtClean="0">
+                <a:latin typeface="+mj-lt"/>
+              </a:rPr>
+              <a:t> </a:t>
+            </a:r>
+          </a:p>
+          <a:p>
+            <a:pPr algn="ctr"/>
+            <a:r>
+              <a:rPr lang="it-IT" sz="2800" b="1" dirty="0" err="1" smtClean="0">
+                <a:latin typeface="+mj-lt"/>
+              </a:rPr>
+              <a:t>Control</a:t>
+            </a:r>
+            <a:r>
+              <a:rPr lang="it-IT" sz="2800" b="1" dirty="0" smtClean="0">
+                <a:latin typeface="+mj-lt"/>
+              </a:rPr>
+              <a:t> Gestione Personale</a:t>
+            </a:r>
+            <a:endParaRPr lang="it-IT" sz="2800" b="1" dirty="0" smtClean="0">
+              <a:latin typeface="+mj-lt"/>
+            </a:endParaRPr>
+          </a:p>
+          <a:p>
+            <a:pPr algn="ctr"/>
+            <a:endParaRPr lang="it-IT" dirty="0">
+              <a:latin typeface="+mj-lt"/>
+            </a:endParaRPr>
+          </a:p>
+        </p:txBody>
+      </p:sp>
+      <p:sp>
+        <p:nvSpPr>
+          <p:cNvPr id="4" name="Content Placeholder 3"/>
+          <p:cNvSpPr txBox="1">
+            <a:spLocks/>
+          </p:cNvSpPr>
+          <p:nvPr/>
+        </p:nvSpPr>
+        <p:spPr>
+          <a:xfrm>
+            <a:off x="539552" y="2564904"/>
+            <a:ext cx="8208912" cy="3865896"/>
+          </a:xfrm>
+          <a:prstGeom prst="rect">
+            <a:avLst/>
+          </a:prstGeom>
+        </p:spPr>
+        <p:txBody>
+          <a:bodyPr tIns="0"/>
+          <a:lstStyle>
+            <a:lvl1pPr marL="274320" indent="-274320" algn="l" rtl="0" eaLnBrk="1" latinLnBrk="0" hangingPunct="1">
+              <a:spcBef>
+                <a:spcPct val="20000"/>
+              </a:spcBef>
+              <a:buClrTx/>
+              <a:buSzPct val="95000"/>
+              <a:buFont typeface="Wingdings" pitchFamily="2" charset="2"/>
+              <a:buChar char="v"/>
+              <a:defRPr kumimoji="0" sz="2800" kern="1200">
+                <a:solidFill>
+                  <a:schemeClr val="tx1"/>
+                </a:solidFill>
+                <a:latin typeface="+mn-lt"/>
+                <a:ea typeface="+mn-ea"/>
+                <a:cs typeface="+mn-cs"/>
+              </a:defRPr>
+            </a:lvl1pPr>
+            <a:lvl2pPr marL="640080" indent="-246888" algn="l" rtl="0" eaLnBrk="1" latinLnBrk="0" hangingPunct="1">
+              <a:spcBef>
+                <a:spcPct val="20000"/>
+              </a:spcBef>
+              <a:buClrTx/>
+              <a:buSzPct val="85000"/>
+              <a:buFont typeface="Courier New" pitchFamily="49" charset="0"/>
+              <a:buChar char="o"/>
+              <a:defRPr kumimoji="0" sz="2600" kern="1200">
+                <a:solidFill>
+                  <a:schemeClr val="tx1"/>
+                </a:solidFill>
+                <a:latin typeface="+mn-lt"/>
+                <a:ea typeface="+mn-ea"/>
+                <a:cs typeface="+mn-cs"/>
+              </a:defRPr>
+            </a:lvl2pPr>
+            <a:lvl3pPr marL="914400" indent="-246888" algn="l" rtl="0" eaLnBrk="1" latinLnBrk="0" hangingPunct="1">
+              <a:spcBef>
+                <a:spcPct val="20000"/>
+              </a:spcBef>
+              <a:buClrTx/>
+              <a:buSzPct val="70000"/>
+              <a:buFont typeface="Wingdings 2"/>
+              <a:buChar char=""/>
+              <a:defRPr kumimoji="0" sz="2400" kern="1200">
+                <a:solidFill>
+                  <a:schemeClr val="tx1"/>
+                </a:solidFill>
+                <a:latin typeface="+mn-lt"/>
+                <a:ea typeface="+mn-ea"/>
+                <a:cs typeface="+mn-cs"/>
+              </a:defRPr>
+            </a:lvl3pPr>
+            <a:lvl4pPr marL="1188720" indent="-210312" algn="l" rtl="0" eaLnBrk="1" latinLnBrk="0" hangingPunct="1">
+              <a:spcBef>
+                <a:spcPct val="20000"/>
+              </a:spcBef>
+              <a:buClrTx/>
+              <a:buSzPct val="65000"/>
+              <a:buFont typeface="Wingdings 2"/>
+              <a:buChar char=""/>
+              <a:defRPr kumimoji="0" sz="2000" kern="1200">
+                <a:solidFill>
+                  <a:schemeClr val="tx1"/>
+                </a:solidFill>
+                <a:latin typeface="+mn-lt"/>
+                <a:ea typeface="+mn-ea"/>
+                <a:cs typeface="+mn-cs"/>
+              </a:defRPr>
+            </a:lvl4pPr>
+            <a:lvl5pPr marL="1463040" indent="-210312" algn="l" rtl="0" eaLnBrk="1" latinLnBrk="0" hangingPunct="1">
+              <a:spcBef>
+                <a:spcPct val="20000"/>
+              </a:spcBef>
+              <a:buClrTx/>
+              <a:buSzPct val="65000"/>
+              <a:buFont typeface="Wingdings 2"/>
+              <a:buChar char=""/>
+              <a:defRPr kumimoji="0" sz="1800" kern="1200">
+                <a:solidFill>
+                  <a:schemeClr val="tx1"/>
+                </a:solidFill>
+                <a:latin typeface="+mn-lt"/>
+                <a:ea typeface="+mn-ea"/>
+                <a:cs typeface="+mn-cs"/>
+              </a:defRPr>
+            </a:lvl5pPr>
+            <a:lvl6pPr marL="1737360" indent="-210312" algn="l" rtl="0" eaLnBrk="1" latinLnBrk="0" hangingPunct="1">
+              <a:spcBef>
+                <a:spcPct val="20000"/>
+              </a:spcBef>
+              <a:buClr>
+                <a:schemeClr val="accent5"/>
+              </a:buClr>
+              <a:buSzPct val="80000"/>
+              <a:buFont typeface="Wingdings 2"/>
+              <a:buChar char=""/>
+              <a:defRPr kumimoji="0" sz="1800" kern="1200">
+                <a:solidFill>
+                  <a:schemeClr val="tx1"/>
+                </a:solidFill>
+                <a:latin typeface="+mn-lt"/>
+                <a:ea typeface="+mn-ea"/>
+                <a:cs typeface="+mn-cs"/>
+              </a:defRPr>
+            </a:lvl6pPr>
+            <a:lvl7pPr marL="1920240" indent="-182880" algn="l" rtl="0" eaLnBrk="1" latinLnBrk="0" hangingPunct="1">
+              <a:spcBef>
+                <a:spcPct val="20000"/>
+              </a:spcBef>
+              <a:buClr>
+                <a:schemeClr val="accent6"/>
+              </a:buClr>
+              <a:buSzPct val="80000"/>
+              <a:buFont typeface="Wingdings 2"/>
+              <a:buChar char=""/>
+              <a:defRPr kumimoji="0" sz="1600" kern="1200" baseline="0">
+                <a:solidFill>
+                  <a:schemeClr val="tx1"/>
+                </a:solidFill>
+                <a:latin typeface="+mn-lt"/>
+                <a:ea typeface="+mn-ea"/>
+                <a:cs typeface="+mn-cs"/>
+              </a:defRPr>
+            </a:lvl7pPr>
+            <a:lvl8pPr marL="2194560" indent="-182880" algn="l" rtl="0" eaLnBrk="1" latinLnBrk="0" hangingPunct="1">
+              <a:spcBef>
+                <a:spcPct val="20000"/>
+              </a:spcBef>
+              <a:buClr>
+                <a:schemeClr val="tx2"/>
+              </a:buClr>
+              <a:buChar char="•"/>
+              <a:defRPr kumimoji="0" sz="1600" kern="1200">
+                <a:solidFill>
+                  <a:schemeClr val="tx1"/>
+                </a:solidFill>
+                <a:latin typeface="+mn-lt"/>
+                <a:ea typeface="+mn-ea"/>
+                <a:cs typeface="+mn-cs"/>
+              </a:defRPr>
+            </a:lvl8pPr>
+            <a:lvl9pPr marL="2468880" indent="-182880" algn="l" rtl="0" eaLnBrk="1" latinLnBrk="0" hangingPunct="1">
+              <a:spcBef>
+                <a:spcPct val="20000"/>
+              </a:spcBef>
+              <a:buClr>
+                <a:schemeClr val="tx2"/>
+              </a:buClr>
+              <a:buFontTx/>
+              <a:buChar char="•"/>
+              <a:defRPr kumimoji="0" sz="1400" kern="1200" baseline="0">
+                <a:solidFill>
+                  <a:schemeClr val="tx1"/>
+                </a:solidFill>
+                <a:latin typeface="+mn-lt"/>
+                <a:ea typeface="+mn-ea"/>
+                <a:cs typeface="+mn-cs"/>
+              </a:defRPr>
+            </a:lvl9pPr>
+          </a:lstStyle>
+          <a:p>
+            <a:pPr marL="0" indent="0">
+              <a:buNone/>
+            </a:pPr>
+            <a:r>
+              <a:rPr lang="it-IT" dirty="0" smtClean="0"/>
+              <a:t>Il </a:t>
+            </a:r>
+            <a:r>
+              <a:rPr lang="it-IT" b="1" dirty="0" err="1" smtClean="0"/>
+              <a:t>Control</a:t>
+            </a:r>
+            <a:r>
+              <a:rPr lang="it-IT" b="1" dirty="0" smtClean="0"/>
+              <a:t> Gestione Personale </a:t>
+            </a:r>
+            <a:r>
+              <a:rPr lang="it-IT" dirty="0" smtClean="0"/>
+              <a:t>si occupa di gestire i profili del personale, con le classiche funzioni per crearle, modificarle e cancellarle.</a:t>
+            </a:r>
+            <a:endParaRPr lang="en-US" dirty="0" smtClean="0"/>
+          </a:p>
+          <a:p>
+            <a:pPr marL="0" indent="0">
+              <a:buNone/>
+            </a:pPr>
+            <a:endParaRPr lang="en-US" dirty="0"/>
+          </a:p>
+        </p:txBody>
+      </p:sp>
+    </p:spTree>
+    <p:extLst>
+      <p:ext uri="{BB962C8B-B14F-4D97-AF65-F5344CB8AC3E}">
+        <p14:creationId xmlns="" xmlns:p14="http://schemas.microsoft.com/office/powerpoint/2010/main" val="155874689"/>
+      </p:ext>
+    </p:extLst>
+  </p:cSld>
+  <p:clrMapOvr>
+    <a:masterClrMapping/>
+  </p:clrMapOvr>
+  <mc:AlternateContent xmlns:mc="http://schemas.openxmlformats.org/markup-compatibility/2006">
+    <mc:Choice xmlns="" xmlns:p14="http://schemas.microsoft.com/office/powerpoint/2010/main" Requires="p14">
+      <p:transition spd="slow" p14:dur="2000"/>
+    </mc:Choice>
+    <mc:Fallback>
+      <p:transition spd="slow"/>
+    </mc:Fallback>
+  </mc:AlternateContent>
+  <p:timing>
+    <p:tnLst>
+      <p:par>
+        <p:cTn id="1" dur="indefinite" restart="never" nodeType="tmRoot"/>
+      </p:par>
+    </p:tnLst>
+  </p:timing>
+</p:sld>
+</file>
+
+<file path=ppt/slides/slide13.xml><?xml version="1.0" encoding="utf-8"?>
+<p:sld xmlns:a="http://schemas.openxmlformats.org/drawingml/2006/main" xmlns:r="http://schemas.openxmlformats.org/officeDocument/2006/relationships" xmlns:p="http://schemas.openxmlformats.org/presentationml/2006/main">
+  <p:cSld>
+    <p:spTree>
+      <p:nvGrpSpPr>
+        <p:cNvPr id="1" name=""/>
+        <p:cNvGrpSpPr/>
+        <p:nvPr/>
+      </p:nvGrpSpPr>
+      <p:grpSpPr>
+        <a:xfrm>
+          <a:off x="0" y="0"/>
+          <a:ext cx="0" cy="0"/>
+          <a:chOff x="0" y="0"/>
+          <a:chExt cx="0" cy="0"/>
+        </a:xfrm>
+      </p:grpSpPr>
+      <p:sp>
+        <p:nvSpPr>
+          <p:cNvPr id="2" name="CasellaDiTesto 1"/>
+          <p:cNvSpPr txBox="1"/>
+          <p:nvPr/>
+        </p:nvSpPr>
+        <p:spPr>
+          <a:xfrm>
+            <a:off x="2608254" y="476672"/>
+            <a:ext cx="4242443" cy="1538883"/>
+          </a:xfrm>
+          <a:prstGeom prst="rect">
+            <a:avLst/>
+          </a:prstGeom>
+          <a:noFill/>
+        </p:spPr>
+        <p:txBody>
+          <a:bodyPr wrap="none" rtlCol="0">
+            <a:spAutoFit/>
+          </a:bodyPr>
+          <a:lstStyle/>
+          <a:p>
+            <a:pPr algn="ctr"/>
+            <a:r>
+              <a:rPr lang="it-IT" sz="4800" b="1" dirty="0" err="1" smtClean="0">
+                <a:latin typeface="+mj-lt"/>
+              </a:rPr>
+              <a:t>Application</a:t>
+            </a:r>
+            <a:r>
+              <a:rPr lang="it-IT" sz="4800" b="1" dirty="0" smtClean="0">
+                <a:latin typeface="+mj-lt"/>
+              </a:rPr>
+              <a:t> </a:t>
+            </a:r>
+          </a:p>
+          <a:p>
+            <a:pPr algn="ctr"/>
+            <a:r>
+              <a:rPr lang="it-IT" sz="2800" b="1" dirty="0" err="1" smtClean="0">
+                <a:latin typeface="+mj-lt"/>
+              </a:rPr>
+              <a:t>Control</a:t>
+            </a:r>
+            <a:r>
+              <a:rPr lang="it-IT" sz="2800" b="1" dirty="0" smtClean="0">
+                <a:latin typeface="+mj-lt"/>
+              </a:rPr>
+              <a:t> Gestione Personale</a:t>
+            </a:r>
+            <a:endParaRPr lang="it-IT" sz="2800" b="1" dirty="0" smtClean="0">
+              <a:latin typeface="+mj-lt"/>
+            </a:endParaRPr>
+          </a:p>
+          <a:p>
+            <a:pPr algn="ctr"/>
+            <a:endParaRPr lang="it-IT" dirty="0">
+              <a:latin typeface="+mj-lt"/>
+            </a:endParaRPr>
+          </a:p>
+        </p:txBody>
+      </p:sp>
+      <p:sp>
+        <p:nvSpPr>
+          <p:cNvPr id="4" name="Content Placeholder 3"/>
+          <p:cNvSpPr txBox="1">
+            <a:spLocks/>
+          </p:cNvSpPr>
+          <p:nvPr/>
+        </p:nvSpPr>
+        <p:spPr>
+          <a:xfrm>
+            <a:off x="539552" y="2564904"/>
+            <a:ext cx="8208912" cy="3865896"/>
+          </a:xfrm>
+          <a:prstGeom prst="rect">
+            <a:avLst/>
+          </a:prstGeom>
+        </p:spPr>
+        <p:txBody>
+          <a:bodyPr tIns="0"/>
+          <a:lstStyle>
+            <a:lvl1pPr marL="274320" indent="-274320" algn="l" rtl="0" eaLnBrk="1" latinLnBrk="0" hangingPunct="1">
+              <a:spcBef>
+                <a:spcPct val="20000"/>
+              </a:spcBef>
+              <a:buClrTx/>
+              <a:buSzPct val="95000"/>
+              <a:buFont typeface="Wingdings" pitchFamily="2" charset="2"/>
+              <a:buChar char="v"/>
+              <a:defRPr kumimoji="0" sz="2800" kern="1200">
+                <a:solidFill>
+                  <a:schemeClr val="tx1"/>
+                </a:solidFill>
+                <a:latin typeface="+mn-lt"/>
+                <a:ea typeface="+mn-ea"/>
+                <a:cs typeface="+mn-cs"/>
+              </a:defRPr>
+            </a:lvl1pPr>
+            <a:lvl2pPr marL="640080" indent="-246888" algn="l" rtl="0" eaLnBrk="1" latinLnBrk="0" hangingPunct="1">
+              <a:spcBef>
+                <a:spcPct val="20000"/>
+              </a:spcBef>
+              <a:buClrTx/>
+              <a:buSzPct val="85000"/>
+              <a:buFont typeface="Courier New" pitchFamily="49" charset="0"/>
+              <a:buChar char="o"/>
+              <a:defRPr kumimoji="0" sz="2600" kern="1200">
+                <a:solidFill>
+                  <a:schemeClr val="tx1"/>
+                </a:solidFill>
+                <a:latin typeface="+mn-lt"/>
+                <a:ea typeface="+mn-ea"/>
+                <a:cs typeface="+mn-cs"/>
+              </a:defRPr>
+            </a:lvl2pPr>
+            <a:lvl3pPr marL="914400" indent="-246888" algn="l" rtl="0" eaLnBrk="1" latinLnBrk="0" hangingPunct="1">
+              <a:spcBef>
+                <a:spcPct val="20000"/>
+              </a:spcBef>
+              <a:buClrTx/>
+              <a:buSzPct val="70000"/>
+              <a:buFont typeface="Wingdings 2"/>
+              <a:buChar char=""/>
+              <a:defRPr kumimoji="0" sz="2400" kern="1200">
+                <a:solidFill>
+                  <a:schemeClr val="tx1"/>
+                </a:solidFill>
+                <a:latin typeface="+mn-lt"/>
+                <a:ea typeface="+mn-ea"/>
+                <a:cs typeface="+mn-cs"/>
+              </a:defRPr>
+            </a:lvl3pPr>
+            <a:lvl4pPr marL="1188720" indent="-210312" algn="l" rtl="0" eaLnBrk="1" latinLnBrk="0" hangingPunct="1">
+              <a:spcBef>
+                <a:spcPct val="20000"/>
+              </a:spcBef>
+              <a:buClrTx/>
+              <a:buSzPct val="65000"/>
+              <a:buFont typeface="Wingdings 2"/>
+              <a:buChar char=""/>
+              <a:defRPr kumimoji="0" sz="2000" kern="1200">
+                <a:solidFill>
+                  <a:schemeClr val="tx1"/>
+                </a:solidFill>
+                <a:latin typeface="+mn-lt"/>
+                <a:ea typeface="+mn-ea"/>
+                <a:cs typeface="+mn-cs"/>
+              </a:defRPr>
+            </a:lvl4pPr>
+            <a:lvl5pPr marL="1463040" indent="-210312" algn="l" rtl="0" eaLnBrk="1" latinLnBrk="0" hangingPunct="1">
+              <a:spcBef>
+                <a:spcPct val="20000"/>
+              </a:spcBef>
+              <a:buClrTx/>
+              <a:buSzPct val="65000"/>
+              <a:buFont typeface="Wingdings 2"/>
+              <a:buChar char=""/>
+              <a:defRPr kumimoji="0" sz="1800" kern="1200">
+                <a:solidFill>
+                  <a:schemeClr val="tx1"/>
+                </a:solidFill>
+                <a:latin typeface="+mn-lt"/>
+                <a:ea typeface="+mn-ea"/>
+                <a:cs typeface="+mn-cs"/>
+              </a:defRPr>
+            </a:lvl5pPr>
+            <a:lvl6pPr marL="1737360" indent="-210312" algn="l" rtl="0" eaLnBrk="1" latinLnBrk="0" hangingPunct="1">
+              <a:spcBef>
+                <a:spcPct val="20000"/>
+              </a:spcBef>
+              <a:buClr>
+                <a:schemeClr val="accent5"/>
+              </a:buClr>
+              <a:buSzPct val="80000"/>
+              <a:buFont typeface="Wingdings 2"/>
+              <a:buChar char=""/>
+              <a:defRPr kumimoji="0" sz="1800" kern="1200">
+                <a:solidFill>
+                  <a:schemeClr val="tx1"/>
+                </a:solidFill>
+                <a:latin typeface="+mn-lt"/>
+                <a:ea typeface="+mn-ea"/>
+                <a:cs typeface="+mn-cs"/>
+              </a:defRPr>
+            </a:lvl6pPr>
+            <a:lvl7pPr marL="1920240" indent="-182880" algn="l" rtl="0" eaLnBrk="1" latinLnBrk="0" hangingPunct="1">
+              <a:spcBef>
+                <a:spcPct val="20000"/>
+              </a:spcBef>
+              <a:buClr>
+                <a:schemeClr val="accent6"/>
+              </a:buClr>
+              <a:buSzPct val="80000"/>
+              <a:buFont typeface="Wingdings 2"/>
+              <a:buChar char=""/>
+              <a:defRPr kumimoji="0" sz="1600" kern="1200" baseline="0">
+                <a:solidFill>
+                  <a:schemeClr val="tx1"/>
+                </a:solidFill>
+                <a:latin typeface="+mn-lt"/>
+                <a:ea typeface="+mn-ea"/>
+                <a:cs typeface="+mn-cs"/>
+              </a:defRPr>
+            </a:lvl7pPr>
+            <a:lvl8pPr marL="2194560" indent="-182880" algn="l" rtl="0" eaLnBrk="1" latinLnBrk="0" hangingPunct="1">
+              <a:spcBef>
+                <a:spcPct val="20000"/>
+              </a:spcBef>
+              <a:buClr>
+                <a:schemeClr val="tx2"/>
+              </a:buClr>
+              <a:buChar char="•"/>
+              <a:defRPr kumimoji="0" sz="1600" kern="1200">
+                <a:solidFill>
+                  <a:schemeClr val="tx1"/>
+                </a:solidFill>
+                <a:latin typeface="+mn-lt"/>
+                <a:ea typeface="+mn-ea"/>
+                <a:cs typeface="+mn-cs"/>
+              </a:defRPr>
+            </a:lvl8pPr>
+            <a:lvl9pPr marL="2468880" indent="-182880" algn="l" rtl="0" eaLnBrk="1" latinLnBrk="0" hangingPunct="1">
+              <a:spcBef>
+                <a:spcPct val="20000"/>
+              </a:spcBef>
+              <a:buClr>
+                <a:schemeClr val="tx2"/>
+              </a:buClr>
+              <a:buFontTx/>
+              <a:buChar char="•"/>
+              <a:defRPr kumimoji="0" sz="1400" kern="1200" baseline="0">
+                <a:solidFill>
+                  <a:schemeClr val="tx1"/>
+                </a:solidFill>
+                <a:latin typeface="+mn-lt"/>
+                <a:ea typeface="+mn-ea"/>
+                <a:cs typeface="+mn-cs"/>
+              </a:defRPr>
+            </a:lvl9pPr>
+          </a:lstStyle>
+          <a:p>
+            <a:pPr marL="0" indent="0">
+              <a:buNone/>
+            </a:pPr>
+            <a:r>
+              <a:rPr lang="it-IT" dirty="0" smtClean="0"/>
+              <a:t>Il </a:t>
+            </a:r>
+            <a:r>
+              <a:rPr lang="it-IT" b="1" dirty="0" err="1" smtClean="0"/>
+              <a:t>Control</a:t>
+            </a:r>
+            <a:r>
+              <a:rPr lang="it-IT" b="1" dirty="0" smtClean="0"/>
+              <a:t> Gestione Bando </a:t>
+            </a:r>
+            <a:r>
+              <a:rPr lang="it-IT" dirty="0" smtClean="0"/>
+              <a:t>si occupa di gestire il bando di iscrizione, permette di modificarlo, di assegnare i </a:t>
+            </a:r>
+            <a:r>
+              <a:rPr lang="it-IT" b="1" dirty="0" smtClean="0"/>
+              <a:t>punteggi </a:t>
+            </a:r>
+            <a:r>
+              <a:rPr lang="it-IT" dirty="0" smtClean="0"/>
+              <a:t>alle domande di iscrizione legate al bando attuale, </a:t>
+            </a:r>
+            <a:r>
+              <a:rPr lang="it-IT" b="1" dirty="0" smtClean="0"/>
+              <a:t>confermare o rifiutare </a:t>
+            </a:r>
+            <a:r>
+              <a:rPr lang="it-IT" dirty="0" smtClean="0"/>
+              <a:t>una domanda. Inoltre permette di effettuare una </a:t>
+            </a:r>
+            <a:r>
+              <a:rPr lang="it-IT" b="1" dirty="0" smtClean="0"/>
+              <a:t>ricerca per stato </a:t>
+            </a:r>
+            <a:r>
+              <a:rPr lang="it-IT" dirty="0" smtClean="0"/>
+              <a:t>in modo da trovare più velocemente una categoria di utenti su cui effettuare determinate operazioni.</a:t>
+            </a:r>
+            <a:endParaRPr lang="en-US" dirty="0" smtClean="0"/>
+          </a:p>
+          <a:p>
+            <a:pPr marL="0" indent="0">
+              <a:buNone/>
+            </a:pPr>
+            <a:endParaRPr lang="en-US" dirty="0"/>
+          </a:p>
+        </p:txBody>
+      </p:sp>
+    </p:spTree>
+    <p:extLst>
+      <p:ext uri="{BB962C8B-B14F-4D97-AF65-F5344CB8AC3E}">
+        <p14:creationId xmlns="" xmlns:p14="http://schemas.microsoft.com/office/powerpoint/2010/main" val="155874689"/>
+      </p:ext>
+    </p:extLst>
+  </p:cSld>
+  <p:clrMapOvr>
+    <a:masterClrMapping/>
+  </p:clrMapOvr>
+  <mc:AlternateContent xmlns:mc="http://schemas.openxmlformats.org/markup-compatibility/2006">
+    <mc:Choice xmlns="" xmlns:p14="http://schemas.microsoft.com/office/powerpoint/2010/main" Requires="p14">
+      <p:transition spd="slow" p14:dur="2000"/>
+    </mc:Choice>
+    <mc:Fallback>
+      <p:transition spd="slow"/>
+    </mc:Fallback>
+  </mc:AlternateContent>
+  <p:timing>
+    <p:tnLst>
+      <p:par>
+        <p:cTn id="1" dur="indefinite" restart="never" nodeType="tmRoot"/>
+      </p:par>
+    </p:tnLst>
+  </p:timing>
+</p:sld>
+</file>
+
+<file path=ppt/slides/slide14.xml><?xml version="1.0" encoding="utf-8"?>
+<p:sld xmlns:a="http://schemas.openxmlformats.org/drawingml/2006/main" xmlns:r="http://schemas.openxmlformats.org/officeDocument/2006/relationships" xmlns:p="http://schemas.openxmlformats.org/presentationml/2006/main">
+  <p:cSld>
+    <p:spTree>
+      <p:nvGrpSpPr>
+        <p:cNvPr id="1" name=""/>
+        <p:cNvGrpSpPr/>
+        <p:nvPr/>
+      </p:nvGrpSpPr>
+      <p:grpSpPr>
+        <a:xfrm>
+          <a:off x="0" y="0"/>
+          <a:ext cx="0" cy="0"/>
+          <a:chOff x="0" y="0"/>
+          <a:chExt cx="0" cy="0"/>
+        </a:xfrm>
+      </p:grpSpPr>
+      <p:sp>
+        <p:nvSpPr>
+          <p:cNvPr id="2" name="CasellaDiTesto 1"/>
+          <p:cNvSpPr txBox="1"/>
+          <p:nvPr/>
+        </p:nvSpPr>
+        <p:spPr>
+          <a:xfrm>
+            <a:off x="3110923" y="476672"/>
+            <a:ext cx="3237105" cy="1538883"/>
+          </a:xfrm>
+          <a:prstGeom prst="rect">
+            <a:avLst/>
+          </a:prstGeom>
+          <a:noFill/>
+        </p:spPr>
+        <p:txBody>
+          <a:bodyPr wrap="none" rtlCol="0">
+            <a:spAutoFit/>
+          </a:bodyPr>
+          <a:lstStyle/>
+          <a:p>
+            <a:pPr algn="ctr"/>
+            <a:r>
+              <a:rPr lang="it-IT" sz="4800" b="1" dirty="0" err="1" smtClean="0">
+                <a:latin typeface="+mj-lt"/>
+              </a:rPr>
+              <a:t>Application</a:t>
+            </a:r>
+            <a:r>
+              <a:rPr lang="it-IT" sz="4800" b="1" dirty="0" smtClean="0">
+                <a:latin typeface="+mj-lt"/>
+              </a:rPr>
+              <a:t> </a:t>
+            </a:r>
+          </a:p>
+          <a:p>
+            <a:pPr algn="ctr"/>
+            <a:r>
+              <a:rPr lang="it-IT" sz="2800" b="1" dirty="0" err="1" smtClean="0">
+                <a:latin typeface="+mj-lt"/>
+              </a:rPr>
+              <a:t>Control</a:t>
+            </a:r>
+            <a:r>
+              <a:rPr lang="it-IT" sz="2800" b="1" dirty="0" smtClean="0">
+                <a:latin typeface="+mj-lt"/>
+              </a:rPr>
+              <a:t> Classi</a:t>
+            </a:r>
+            <a:endParaRPr lang="it-IT" sz="2800" b="1" dirty="0" smtClean="0">
+              <a:latin typeface="+mj-lt"/>
+            </a:endParaRPr>
+          </a:p>
+          <a:p>
+            <a:pPr algn="ctr"/>
+            <a:endParaRPr lang="it-IT" dirty="0">
+              <a:latin typeface="+mj-lt"/>
+            </a:endParaRPr>
+          </a:p>
+        </p:txBody>
+      </p:sp>
+      <p:sp>
+        <p:nvSpPr>
+          <p:cNvPr id="5" name="Content Placeholder 3"/>
+          <p:cNvSpPr txBox="1">
+            <a:spLocks/>
+          </p:cNvSpPr>
+          <p:nvPr/>
+        </p:nvSpPr>
+        <p:spPr>
+          <a:xfrm>
+            <a:off x="467544" y="1844824"/>
+            <a:ext cx="8424936" cy="4608512"/>
+          </a:xfrm>
+          <a:prstGeom prst="rect">
+            <a:avLst/>
+          </a:prstGeom>
+        </p:spPr>
+        <p:txBody>
+          <a:bodyPr tIns="0"/>
+          <a:lstStyle>
+            <a:lvl1pPr marL="274320" indent="-274320" algn="l" rtl="0" eaLnBrk="1" latinLnBrk="0" hangingPunct="1">
+              <a:spcBef>
+                <a:spcPct val="20000"/>
+              </a:spcBef>
+              <a:buClrTx/>
+              <a:buSzPct val="95000"/>
+              <a:buFont typeface="Wingdings" pitchFamily="2" charset="2"/>
+              <a:buChar char="v"/>
+              <a:defRPr kumimoji="0" sz="2800" kern="1200">
+                <a:solidFill>
+                  <a:schemeClr val="tx1"/>
+                </a:solidFill>
+                <a:latin typeface="+mn-lt"/>
+                <a:ea typeface="+mn-ea"/>
+                <a:cs typeface="+mn-cs"/>
+              </a:defRPr>
+            </a:lvl1pPr>
+            <a:lvl2pPr marL="640080" indent="-246888" algn="l" rtl="0" eaLnBrk="1" latinLnBrk="0" hangingPunct="1">
+              <a:spcBef>
+                <a:spcPct val="20000"/>
+              </a:spcBef>
+              <a:buClrTx/>
+              <a:buSzPct val="85000"/>
+              <a:buFont typeface="Courier New" pitchFamily="49" charset="0"/>
+              <a:buChar char="o"/>
+              <a:defRPr kumimoji="0" sz="2600" kern="1200">
+                <a:solidFill>
+                  <a:schemeClr val="tx1"/>
+                </a:solidFill>
+                <a:latin typeface="+mn-lt"/>
+                <a:ea typeface="+mn-ea"/>
+                <a:cs typeface="+mn-cs"/>
+              </a:defRPr>
+            </a:lvl2pPr>
+            <a:lvl3pPr marL="914400" indent="-246888" algn="l" rtl="0" eaLnBrk="1" latinLnBrk="0" hangingPunct="1">
+              <a:spcBef>
+                <a:spcPct val="20000"/>
+              </a:spcBef>
+              <a:buClrTx/>
+              <a:buSzPct val="70000"/>
+              <a:buFont typeface="Wingdings 2"/>
+              <a:buChar char=""/>
+              <a:defRPr kumimoji="0" sz="2400" kern="1200">
+                <a:solidFill>
+                  <a:schemeClr val="tx1"/>
+                </a:solidFill>
+                <a:latin typeface="+mn-lt"/>
+                <a:ea typeface="+mn-ea"/>
+                <a:cs typeface="+mn-cs"/>
+              </a:defRPr>
+            </a:lvl3pPr>
+            <a:lvl4pPr marL="1188720" indent="-210312" algn="l" rtl="0" eaLnBrk="1" latinLnBrk="0" hangingPunct="1">
+              <a:spcBef>
+                <a:spcPct val="20000"/>
+              </a:spcBef>
+              <a:buClrTx/>
+              <a:buSzPct val="65000"/>
+              <a:buFont typeface="Wingdings 2"/>
+              <a:buChar char=""/>
+              <a:defRPr kumimoji="0" sz="2000" kern="1200">
+                <a:solidFill>
+                  <a:schemeClr val="tx1"/>
+                </a:solidFill>
+                <a:latin typeface="+mn-lt"/>
+                <a:ea typeface="+mn-ea"/>
+                <a:cs typeface="+mn-cs"/>
+              </a:defRPr>
+            </a:lvl4pPr>
+            <a:lvl5pPr marL="1463040" indent="-210312" algn="l" rtl="0" eaLnBrk="1" latinLnBrk="0" hangingPunct="1">
+              <a:spcBef>
+                <a:spcPct val="20000"/>
+              </a:spcBef>
+              <a:buClrTx/>
+              <a:buSzPct val="65000"/>
+              <a:buFont typeface="Wingdings 2"/>
+              <a:buChar char=""/>
+              <a:defRPr kumimoji="0" sz="1800" kern="1200">
+                <a:solidFill>
+                  <a:schemeClr val="tx1"/>
+                </a:solidFill>
+                <a:latin typeface="+mn-lt"/>
+                <a:ea typeface="+mn-ea"/>
+                <a:cs typeface="+mn-cs"/>
+              </a:defRPr>
+            </a:lvl5pPr>
+            <a:lvl6pPr marL="1737360" indent="-210312" algn="l" rtl="0" eaLnBrk="1" latinLnBrk="0" hangingPunct="1">
+              <a:spcBef>
+                <a:spcPct val="20000"/>
+              </a:spcBef>
+              <a:buClr>
+                <a:schemeClr val="accent5"/>
+              </a:buClr>
+              <a:buSzPct val="80000"/>
+              <a:buFont typeface="Wingdings 2"/>
+              <a:buChar char=""/>
+              <a:defRPr kumimoji="0" sz="1800" kern="1200">
+                <a:solidFill>
+                  <a:schemeClr val="tx1"/>
+                </a:solidFill>
+                <a:latin typeface="+mn-lt"/>
+                <a:ea typeface="+mn-ea"/>
+                <a:cs typeface="+mn-cs"/>
+              </a:defRPr>
+            </a:lvl6pPr>
+            <a:lvl7pPr marL="1920240" indent="-182880" algn="l" rtl="0" eaLnBrk="1" latinLnBrk="0" hangingPunct="1">
+              <a:spcBef>
+                <a:spcPct val="20000"/>
+              </a:spcBef>
+              <a:buClr>
+                <a:schemeClr val="accent6"/>
+              </a:buClr>
+              <a:buSzPct val="80000"/>
+              <a:buFont typeface="Wingdings 2"/>
+              <a:buChar char=""/>
+              <a:defRPr kumimoji="0" sz="1600" kern="1200" baseline="0">
+                <a:solidFill>
+                  <a:schemeClr val="tx1"/>
+                </a:solidFill>
+                <a:latin typeface="+mn-lt"/>
+                <a:ea typeface="+mn-ea"/>
+                <a:cs typeface="+mn-cs"/>
+              </a:defRPr>
+            </a:lvl7pPr>
+            <a:lvl8pPr marL="2194560" indent="-182880" algn="l" rtl="0" eaLnBrk="1" latinLnBrk="0" hangingPunct="1">
+              <a:spcBef>
+                <a:spcPct val="20000"/>
+              </a:spcBef>
+              <a:buClr>
+                <a:schemeClr val="tx2"/>
+              </a:buClr>
+              <a:buChar char="•"/>
+              <a:defRPr kumimoji="0" sz="1600" kern="1200">
+                <a:solidFill>
+                  <a:schemeClr val="tx1"/>
+                </a:solidFill>
+                <a:latin typeface="+mn-lt"/>
+                <a:ea typeface="+mn-ea"/>
+                <a:cs typeface="+mn-cs"/>
+              </a:defRPr>
+            </a:lvl8pPr>
+            <a:lvl9pPr marL="2468880" indent="-182880" algn="l" rtl="0" eaLnBrk="1" latinLnBrk="0" hangingPunct="1">
+              <a:spcBef>
+                <a:spcPct val="20000"/>
+              </a:spcBef>
+              <a:buClr>
+                <a:schemeClr val="tx2"/>
+              </a:buClr>
+              <a:buFontTx/>
+              <a:buChar char="•"/>
+              <a:defRPr kumimoji="0" sz="1400" kern="1200" baseline="0">
+                <a:solidFill>
+                  <a:schemeClr val="tx1"/>
+                </a:solidFill>
+                <a:latin typeface="+mn-lt"/>
+                <a:ea typeface="+mn-ea"/>
+                <a:cs typeface="+mn-cs"/>
+              </a:defRPr>
+            </a:lvl9pPr>
+          </a:lstStyle>
+          <a:p>
+            <a:pPr marL="0" indent="0">
+              <a:buNone/>
+            </a:pPr>
+            <a:r>
+              <a:rPr lang="it-IT" dirty="0" smtClean="0"/>
+              <a:t>Il </a:t>
+            </a:r>
+            <a:r>
+              <a:rPr lang="it-IT" b="1" dirty="0" err="1" smtClean="0"/>
+              <a:t>Control</a:t>
+            </a:r>
+            <a:r>
+              <a:rPr lang="it-IT" b="1" dirty="0" smtClean="0"/>
+              <a:t> Classi </a:t>
+            </a:r>
+            <a:r>
+              <a:rPr lang="it-IT" dirty="0" smtClean="0"/>
+              <a:t>si occupa di gestire le </a:t>
+            </a:r>
+            <a:r>
+              <a:rPr lang="it-IT" b="1" dirty="0" smtClean="0"/>
+              <a:t>classi</a:t>
+            </a:r>
+            <a:r>
+              <a:rPr lang="it-IT" dirty="0" smtClean="0"/>
+              <a:t>, dalla loro creazione, modifica, cancellazione alla loro relazione con i bambini. </a:t>
+            </a:r>
+            <a:r>
+              <a:rPr lang="it-IT" b="1" dirty="0" smtClean="0"/>
+              <a:t>Rispettando i requisiti funzionali </a:t>
+            </a:r>
+            <a:r>
+              <a:rPr lang="it-IT" dirty="0" smtClean="0"/>
+              <a:t>del sistema, la composizione di una classe avviene in due fasi successive, con una </a:t>
+            </a:r>
+            <a:r>
+              <a:rPr lang="it-IT" i="1" dirty="0" smtClean="0"/>
+              <a:t>“doppia approvazione”:</a:t>
+            </a:r>
+          </a:p>
+          <a:p>
+            <a:pPr marL="640800" indent="0">
+              <a:buFont typeface="Courier New" pitchFamily="49" charset="0"/>
+              <a:buChar char="o"/>
+            </a:pPr>
+            <a:r>
+              <a:rPr lang="it-IT" sz="2600" dirty="0" smtClean="0"/>
+              <a:t>Nella </a:t>
+            </a:r>
+            <a:r>
+              <a:rPr lang="it-IT" sz="2600" b="1" dirty="0" smtClean="0"/>
+              <a:t>prima fase </a:t>
+            </a:r>
+            <a:r>
+              <a:rPr lang="it-IT" sz="2600" dirty="0" smtClean="0"/>
+              <a:t>l’</a:t>
+            </a:r>
+            <a:r>
+              <a:rPr lang="it-IT" sz="2600" b="1" dirty="0" smtClean="0"/>
+              <a:t>impiegato dell’asilo </a:t>
+            </a:r>
+            <a:r>
+              <a:rPr lang="it-IT" sz="2600" dirty="0" smtClean="0"/>
+              <a:t>sceglie e bambini da assegnare alle </a:t>
+            </a:r>
+            <a:r>
+              <a:rPr lang="it-IT" sz="2600" dirty="0" smtClean="0"/>
+              <a:t>classi e sottomette la composizione al delegato del rettore</a:t>
+            </a:r>
+          </a:p>
+          <a:p>
+            <a:pPr marL="640800" indent="0">
+              <a:buFont typeface="Courier New" pitchFamily="49" charset="0"/>
+              <a:buChar char="o"/>
+            </a:pPr>
+            <a:r>
+              <a:rPr lang="it-IT" sz="2600" dirty="0" smtClean="0"/>
+              <a:t>Nella </a:t>
+            </a:r>
+            <a:r>
+              <a:rPr lang="it-IT" sz="2600" b="1" dirty="0" smtClean="0"/>
+              <a:t>seconda fare </a:t>
+            </a:r>
+            <a:r>
+              <a:rPr lang="it-IT" sz="2600" dirty="0" smtClean="0"/>
+              <a:t>il</a:t>
+            </a:r>
+            <a:r>
+              <a:rPr lang="it-IT" sz="2600" b="1" dirty="0" smtClean="0"/>
+              <a:t> delegato del rettore </a:t>
+            </a:r>
+            <a:r>
+              <a:rPr lang="it-IT" sz="2600" dirty="0" smtClean="0"/>
+              <a:t>sceglie se confermare o rigettare la composizione. Nel caso peggiore, si torna alla prima fase</a:t>
+            </a:r>
+            <a:endParaRPr lang="it-IT" sz="2600" dirty="0" smtClean="0"/>
+          </a:p>
+        </p:txBody>
+      </p:sp>
+    </p:spTree>
+    <p:extLst>
+      <p:ext uri="{BB962C8B-B14F-4D97-AF65-F5344CB8AC3E}">
+        <p14:creationId xmlns="" xmlns:p14="http://schemas.microsoft.com/office/powerpoint/2010/main" val="155874689"/>
+      </p:ext>
+    </p:extLst>
+  </p:cSld>
+  <p:clrMapOvr>
+    <a:masterClrMapping/>
+  </p:clrMapOvr>
+  <mc:AlternateContent xmlns:mc="http://schemas.openxmlformats.org/markup-compatibility/2006">
+    <mc:Choice xmlns="" xmlns:p14="http://schemas.microsoft.com/office/powerpoint/2010/main" Requires="p14">
+      <p:transition spd="slow" p14:dur="2000"/>
+    </mc:Choice>
+    <mc:Fallback>
+      <p:transition spd="slow"/>
+    </mc:Fallback>
+  </mc:AlternateContent>
+  <p:timing>
+    <p:tnLst>
+      <p:par>
+        <p:cTn id="1" dur="indefinite" restart="never" nodeType="tmRoot"/>
+      </p:par>
+    </p:tnLst>
+  </p:timing>
+</p:sld>
+</file>
+
+<file path=ppt/slides/slide15.xml><?xml version="1.0" encoding="utf-8"?>
+<p:sld xmlns:a="http://schemas.openxmlformats.org/drawingml/2006/main" xmlns:r="http://schemas.openxmlformats.org/officeDocument/2006/relationships" xmlns:p="http://schemas.openxmlformats.org/presentationml/2006/main">
+  <p:cSld>
+    <p:spTree>
+      <p:nvGrpSpPr>
+        <p:cNvPr id="1" name=""/>
+        <p:cNvGrpSpPr/>
+        <p:nvPr/>
+      </p:nvGrpSpPr>
+      <p:grpSpPr>
+        <a:xfrm>
+          <a:off x="0" y="0"/>
+          <a:ext cx="0" cy="0"/>
+          <a:chOff x="0" y="0"/>
+          <a:chExt cx="0" cy="0"/>
+        </a:xfrm>
+      </p:grpSpPr>
+      <p:sp>
+        <p:nvSpPr>
+          <p:cNvPr id="2" name="CasellaDiTesto 1"/>
+          <p:cNvSpPr txBox="1"/>
+          <p:nvPr/>
+        </p:nvSpPr>
+        <p:spPr>
+          <a:xfrm>
+            <a:off x="3110921" y="476672"/>
+            <a:ext cx="3237105" cy="1538883"/>
+          </a:xfrm>
+          <a:prstGeom prst="rect">
+            <a:avLst/>
+          </a:prstGeom>
+          <a:noFill/>
+        </p:spPr>
+        <p:txBody>
+          <a:bodyPr wrap="none" rtlCol="0">
+            <a:spAutoFit/>
+          </a:bodyPr>
+          <a:lstStyle/>
+          <a:p>
+            <a:pPr algn="ctr"/>
+            <a:r>
+              <a:rPr lang="it-IT" sz="4800" b="1" dirty="0" err="1" smtClean="0">
+                <a:latin typeface="+mj-lt"/>
+              </a:rPr>
+              <a:t>Application</a:t>
+            </a:r>
+            <a:r>
+              <a:rPr lang="it-IT" sz="4800" b="1" dirty="0" smtClean="0">
+                <a:latin typeface="+mj-lt"/>
+              </a:rPr>
+              <a:t> </a:t>
+            </a:r>
+          </a:p>
+          <a:p>
+            <a:pPr algn="ctr"/>
+            <a:r>
+              <a:rPr lang="it-IT" sz="2800" b="1" dirty="0" smtClean="0">
+                <a:latin typeface="+mj-lt"/>
+              </a:rPr>
+              <a:t>Gestione </a:t>
+            </a:r>
+            <a:r>
+              <a:rPr lang="it-IT" sz="2800" b="1" dirty="0" smtClean="0">
+                <a:latin typeface="+mj-lt"/>
+              </a:rPr>
+              <a:t>Ricerca</a:t>
+            </a:r>
+            <a:endParaRPr lang="it-IT" sz="2800" b="1" dirty="0" smtClean="0">
+              <a:latin typeface="+mj-lt"/>
+            </a:endParaRPr>
+          </a:p>
+          <a:p>
+            <a:pPr algn="ctr"/>
+            <a:endParaRPr lang="it-IT" dirty="0">
+              <a:latin typeface="+mj-lt"/>
+            </a:endParaRPr>
+          </a:p>
+        </p:txBody>
+      </p:sp>
+      <p:sp>
+        <p:nvSpPr>
+          <p:cNvPr id="4" name="Content Placeholder 3"/>
+          <p:cNvSpPr txBox="1">
+            <a:spLocks/>
+          </p:cNvSpPr>
+          <p:nvPr/>
+        </p:nvSpPr>
+        <p:spPr>
+          <a:xfrm>
+            <a:off x="539552" y="2420888"/>
+            <a:ext cx="8208912" cy="3865896"/>
+          </a:xfrm>
+          <a:prstGeom prst="rect">
+            <a:avLst/>
+          </a:prstGeom>
+        </p:spPr>
+        <p:txBody>
+          <a:bodyPr tIns="0"/>
+          <a:lstStyle>
+            <a:lvl1pPr marL="274320" indent="-274320" algn="l" rtl="0" eaLnBrk="1" latinLnBrk="0" hangingPunct="1">
+              <a:spcBef>
+                <a:spcPct val="20000"/>
+              </a:spcBef>
+              <a:buClrTx/>
+              <a:buSzPct val="95000"/>
+              <a:buFont typeface="Wingdings" pitchFamily="2" charset="2"/>
+              <a:buChar char="v"/>
+              <a:defRPr kumimoji="0" sz="2800" kern="1200">
+                <a:solidFill>
+                  <a:schemeClr val="tx1"/>
+                </a:solidFill>
+                <a:latin typeface="+mn-lt"/>
+                <a:ea typeface="+mn-ea"/>
+                <a:cs typeface="+mn-cs"/>
+              </a:defRPr>
+            </a:lvl1pPr>
+            <a:lvl2pPr marL="640080" indent="-246888" algn="l" rtl="0" eaLnBrk="1" latinLnBrk="0" hangingPunct="1">
+              <a:spcBef>
+                <a:spcPct val="20000"/>
+              </a:spcBef>
+              <a:buClrTx/>
+              <a:buSzPct val="85000"/>
+              <a:buFont typeface="Courier New" pitchFamily="49" charset="0"/>
+              <a:buChar char="o"/>
+              <a:defRPr kumimoji="0" sz="2600" kern="1200">
+                <a:solidFill>
+                  <a:schemeClr val="tx1"/>
+                </a:solidFill>
+                <a:latin typeface="+mn-lt"/>
+                <a:ea typeface="+mn-ea"/>
+                <a:cs typeface="+mn-cs"/>
+              </a:defRPr>
+            </a:lvl2pPr>
+            <a:lvl3pPr marL="914400" indent="-246888" algn="l" rtl="0" eaLnBrk="1" latinLnBrk="0" hangingPunct="1">
+              <a:spcBef>
+                <a:spcPct val="20000"/>
+              </a:spcBef>
+              <a:buClrTx/>
+              <a:buSzPct val="70000"/>
+              <a:buFont typeface="Wingdings 2"/>
+              <a:buChar char=""/>
+              <a:defRPr kumimoji="0" sz="2400" kern="1200">
+                <a:solidFill>
+                  <a:schemeClr val="tx1"/>
+                </a:solidFill>
+                <a:latin typeface="+mn-lt"/>
+                <a:ea typeface="+mn-ea"/>
+                <a:cs typeface="+mn-cs"/>
+              </a:defRPr>
+            </a:lvl3pPr>
+            <a:lvl4pPr marL="1188720" indent="-210312" algn="l" rtl="0" eaLnBrk="1" latinLnBrk="0" hangingPunct="1">
+              <a:spcBef>
+                <a:spcPct val="20000"/>
+              </a:spcBef>
+              <a:buClrTx/>
+              <a:buSzPct val="65000"/>
+              <a:buFont typeface="Wingdings 2"/>
+              <a:buChar char=""/>
+              <a:defRPr kumimoji="0" sz="2000" kern="1200">
+                <a:solidFill>
+                  <a:schemeClr val="tx1"/>
+                </a:solidFill>
+                <a:latin typeface="+mn-lt"/>
+                <a:ea typeface="+mn-ea"/>
+                <a:cs typeface="+mn-cs"/>
+              </a:defRPr>
+            </a:lvl4pPr>
+            <a:lvl5pPr marL="1463040" indent="-210312" algn="l" rtl="0" eaLnBrk="1" latinLnBrk="0" hangingPunct="1">
+              <a:spcBef>
+                <a:spcPct val="20000"/>
+              </a:spcBef>
+              <a:buClrTx/>
+              <a:buSzPct val="65000"/>
+              <a:buFont typeface="Wingdings 2"/>
+              <a:buChar char=""/>
+              <a:defRPr kumimoji="0" sz="1800" kern="1200">
+                <a:solidFill>
+                  <a:schemeClr val="tx1"/>
+                </a:solidFill>
+                <a:latin typeface="+mn-lt"/>
+                <a:ea typeface="+mn-ea"/>
+                <a:cs typeface="+mn-cs"/>
+              </a:defRPr>
+            </a:lvl5pPr>
+            <a:lvl6pPr marL="1737360" indent="-210312" algn="l" rtl="0" eaLnBrk="1" latinLnBrk="0" hangingPunct="1">
+              <a:spcBef>
+                <a:spcPct val="20000"/>
+              </a:spcBef>
+              <a:buClr>
+                <a:schemeClr val="accent5"/>
+              </a:buClr>
+              <a:buSzPct val="80000"/>
+              <a:buFont typeface="Wingdings 2"/>
+              <a:buChar char=""/>
+              <a:defRPr kumimoji="0" sz="1800" kern="1200">
+                <a:solidFill>
+                  <a:schemeClr val="tx1"/>
+                </a:solidFill>
+                <a:latin typeface="+mn-lt"/>
+                <a:ea typeface="+mn-ea"/>
+                <a:cs typeface="+mn-cs"/>
+              </a:defRPr>
+            </a:lvl6pPr>
+            <a:lvl7pPr marL="1920240" indent="-182880" algn="l" rtl="0" eaLnBrk="1" latinLnBrk="0" hangingPunct="1">
+              <a:spcBef>
+                <a:spcPct val="20000"/>
+              </a:spcBef>
+              <a:buClr>
+                <a:schemeClr val="accent6"/>
+              </a:buClr>
+              <a:buSzPct val="80000"/>
+              <a:buFont typeface="Wingdings 2"/>
+              <a:buChar char=""/>
+              <a:defRPr kumimoji="0" sz="1600" kern="1200" baseline="0">
+                <a:solidFill>
+                  <a:schemeClr val="tx1"/>
+                </a:solidFill>
+                <a:latin typeface="+mn-lt"/>
+                <a:ea typeface="+mn-ea"/>
+                <a:cs typeface="+mn-cs"/>
+              </a:defRPr>
+            </a:lvl7pPr>
+            <a:lvl8pPr marL="2194560" indent="-182880" algn="l" rtl="0" eaLnBrk="1" latinLnBrk="0" hangingPunct="1">
+              <a:spcBef>
+                <a:spcPct val="20000"/>
+              </a:spcBef>
+              <a:buClr>
+                <a:schemeClr val="tx2"/>
+              </a:buClr>
+              <a:buChar char="•"/>
+              <a:defRPr kumimoji="0" sz="1600" kern="1200">
+                <a:solidFill>
+                  <a:schemeClr val="tx1"/>
+                </a:solidFill>
+                <a:latin typeface="+mn-lt"/>
+                <a:ea typeface="+mn-ea"/>
+                <a:cs typeface="+mn-cs"/>
+              </a:defRPr>
+            </a:lvl8pPr>
+            <a:lvl9pPr marL="2468880" indent="-182880" algn="l" rtl="0" eaLnBrk="1" latinLnBrk="0" hangingPunct="1">
+              <a:spcBef>
+                <a:spcPct val="20000"/>
+              </a:spcBef>
+              <a:buClr>
+                <a:schemeClr val="tx2"/>
+              </a:buClr>
+              <a:buFontTx/>
+              <a:buChar char="•"/>
+              <a:defRPr kumimoji="0" sz="1400" kern="1200" baseline="0">
+                <a:solidFill>
+                  <a:schemeClr val="tx1"/>
+                </a:solidFill>
+                <a:latin typeface="+mn-lt"/>
+                <a:ea typeface="+mn-ea"/>
+                <a:cs typeface="+mn-cs"/>
+              </a:defRPr>
+            </a:lvl9pPr>
+          </a:lstStyle>
+          <a:p>
+            <a:pPr marL="0" indent="0">
+              <a:buNone/>
+            </a:pPr>
+            <a:r>
+              <a:rPr lang="it-IT" dirty="0" smtClean="0"/>
+              <a:t>La </a:t>
+            </a:r>
+            <a:r>
+              <a:rPr lang="it-IT" b="1" dirty="0" smtClean="0"/>
+              <a:t>Gestione </a:t>
+            </a:r>
+            <a:r>
+              <a:rPr lang="it-IT" b="1" dirty="0" smtClean="0"/>
+              <a:t>Ricerca </a:t>
+            </a:r>
+            <a:r>
+              <a:rPr lang="it-IT" dirty="0" smtClean="0"/>
+              <a:t>si </a:t>
+            </a:r>
+            <a:r>
+              <a:rPr lang="it-IT" dirty="0" smtClean="0"/>
+              <a:t>occupa di </a:t>
+            </a:r>
+            <a:r>
+              <a:rPr lang="it-IT" dirty="0" smtClean="0"/>
+              <a:t>gestire la </a:t>
+            </a:r>
+            <a:r>
+              <a:rPr lang="it-IT" b="1" dirty="0" smtClean="0"/>
+              <a:t>ricerca</a:t>
+            </a:r>
+            <a:r>
+              <a:rPr lang="it-IT" dirty="0" smtClean="0"/>
+              <a:t> all’interno del sistema, effettuata </a:t>
+            </a:r>
+            <a:r>
+              <a:rPr lang="it-IT" b="1" dirty="0" smtClean="0"/>
+              <a:t>da</a:t>
+            </a:r>
+            <a:r>
+              <a:rPr lang="it-IT" dirty="0" smtClean="0"/>
+              <a:t> varie tipologie di utenza </a:t>
+            </a:r>
+            <a:r>
+              <a:rPr lang="it-IT" b="1" dirty="0" smtClean="0"/>
+              <a:t>su</a:t>
+            </a:r>
+            <a:r>
+              <a:rPr lang="it-IT" dirty="0" smtClean="0"/>
+              <a:t> varie tipologie di utenza, basandosi su alcuni criteri di visualizzazione.</a:t>
+            </a:r>
+          </a:p>
+          <a:p>
+            <a:pPr marL="0" indent="0">
+              <a:buNone/>
+            </a:pPr>
+            <a:endParaRPr lang="it-IT" dirty="0" smtClean="0"/>
+          </a:p>
+          <a:p>
+            <a:pPr marL="0" indent="0">
+              <a:buNone/>
+            </a:pPr>
+            <a:endParaRPr lang="it-IT" dirty="0" smtClean="0"/>
+          </a:p>
+          <a:p>
+            <a:pPr marL="0" indent="0">
+              <a:buNone/>
+            </a:pPr>
+            <a:endParaRPr lang="en-US" dirty="0"/>
+          </a:p>
+        </p:txBody>
+      </p:sp>
+    </p:spTree>
+    <p:extLst>
+      <p:ext uri="{BB962C8B-B14F-4D97-AF65-F5344CB8AC3E}">
+        <p14:creationId xmlns="" xmlns:p14="http://schemas.microsoft.com/office/powerpoint/2010/main" val="155874689"/>
+      </p:ext>
+    </p:extLst>
+  </p:cSld>
+  <p:clrMapOvr>
+    <a:masterClrMapping/>
+  </p:clrMapOvr>
+  <mc:AlternateContent xmlns:mc="http://schemas.openxmlformats.org/markup-compatibility/2006">
+    <mc:Choice xmlns="" xmlns:p14="http://schemas.microsoft.com/office/powerpoint/2010/main" Requires="p14">
+      <p:transition spd="slow" p14:dur="2000"/>
+    </mc:Choice>
+    <mc:Fallback>
+      <p:transition spd="slow"/>
+    </mc:Fallback>
+  </mc:AlternateContent>
+  <p:timing>
+    <p:tnLst>
+      <p:par>
+        <p:cTn id="1" dur="indefinite" restart="never" nodeType="tmRoot"/>
+      </p:par>
+    </p:tnLst>
+  </p:timing>
+</p:sld>
+</file>
+
+<file path=ppt/slides/slide16.xml><?xml version="1.0" encoding="utf-8"?>
+<p:sld xmlns:a="http://schemas.openxmlformats.org/drawingml/2006/main" xmlns:r="http://schemas.openxmlformats.org/officeDocument/2006/relationships" xmlns:p="http://schemas.openxmlformats.org/presentationml/2006/main">
+  <p:cSld>
+    <p:spTree>
+      <p:nvGrpSpPr>
+        <p:cNvPr id="1" name=""/>
+        <p:cNvGrpSpPr/>
+        <p:nvPr/>
+      </p:nvGrpSpPr>
+      <p:grpSpPr>
+        <a:xfrm>
+          <a:off x="0" y="0"/>
+          <a:ext cx="0" cy="0"/>
+          <a:chOff x="0" y="0"/>
+          <a:chExt cx="0" cy="0"/>
+        </a:xfrm>
+      </p:grpSpPr>
+      <p:sp>
+        <p:nvSpPr>
+          <p:cNvPr id="2" name="CasellaDiTesto 1"/>
+          <p:cNvSpPr txBox="1"/>
+          <p:nvPr/>
+        </p:nvSpPr>
+        <p:spPr>
+          <a:xfrm>
+            <a:off x="3110921" y="476672"/>
+            <a:ext cx="3237105" cy="1538883"/>
+          </a:xfrm>
+          <a:prstGeom prst="rect">
+            <a:avLst/>
+          </a:prstGeom>
+          <a:noFill/>
+        </p:spPr>
+        <p:txBody>
+          <a:bodyPr wrap="none" rtlCol="0">
+            <a:spAutoFit/>
+          </a:bodyPr>
+          <a:lstStyle/>
+          <a:p>
+            <a:pPr algn="ctr"/>
+            <a:r>
+              <a:rPr lang="it-IT" sz="4800" b="1" dirty="0" err="1" smtClean="0">
+                <a:latin typeface="+mj-lt"/>
+              </a:rPr>
+              <a:t>Application</a:t>
+            </a:r>
+            <a:r>
+              <a:rPr lang="it-IT" sz="4800" b="1" dirty="0" smtClean="0">
+                <a:latin typeface="+mj-lt"/>
+              </a:rPr>
+              <a:t> </a:t>
+            </a:r>
+          </a:p>
+          <a:p>
+            <a:pPr algn="ctr"/>
+            <a:r>
+              <a:rPr lang="it-IT" sz="2800" b="1" dirty="0" err="1" smtClean="0">
+                <a:latin typeface="+mj-lt"/>
+              </a:rPr>
+              <a:t>Strategy</a:t>
+            </a:r>
+            <a:r>
+              <a:rPr lang="it-IT" sz="2800" b="1" dirty="0" smtClean="0">
+                <a:latin typeface="+mj-lt"/>
+              </a:rPr>
+              <a:t> Pattern</a:t>
+            </a:r>
+            <a:endParaRPr lang="it-IT" sz="2800" b="1" dirty="0" smtClean="0">
+              <a:latin typeface="+mj-lt"/>
+            </a:endParaRPr>
+          </a:p>
+          <a:p>
+            <a:pPr algn="ctr"/>
+            <a:endParaRPr lang="it-IT" dirty="0">
+              <a:latin typeface="+mj-lt"/>
+            </a:endParaRPr>
+          </a:p>
+        </p:txBody>
+      </p:sp>
+      <p:sp>
+        <p:nvSpPr>
+          <p:cNvPr id="4" name="Content Placeholder 3"/>
+          <p:cNvSpPr txBox="1">
+            <a:spLocks/>
+          </p:cNvSpPr>
+          <p:nvPr/>
+        </p:nvSpPr>
+        <p:spPr>
+          <a:xfrm>
+            <a:off x="611560" y="2204864"/>
+            <a:ext cx="8208912" cy="3865896"/>
+          </a:xfrm>
+          <a:prstGeom prst="rect">
+            <a:avLst/>
+          </a:prstGeom>
+        </p:spPr>
+        <p:txBody>
+          <a:bodyPr tIns="0"/>
+          <a:lstStyle>
+            <a:lvl1pPr marL="274320" indent="-274320" algn="l" rtl="0" eaLnBrk="1" latinLnBrk="0" hangingPunct="1">
+              <a:spcBef>
+                <a:spcPct val="20000"/>
+              </a:spcBef>
+              <a:buClrTx/>
+              <a:buSzPct val="95000"/>
+              <a:buFont typeface="Wingdings" pitchFamily="2" charset="2"/>
+              <a:buChar char="v"/>
+              <a:defRPr kumimoji="0" sz="2800" kern="1200">
+                <a:solidFill>
+                  <a:schemeClr val="tx1"/>
+                </a:solidFill>
+                <a:latin typeface="+mn-lt"/>
+                <a:ea typeface="+mn-ea"/>
+                <a:cs typeface="+mn-cs"/>
+              </a:defRPr>
+            </a:lvl1pPr>
+            <a:lvl2pPr marL="640080" indent="-246888" algn="l" rtl="0" eaLnBrk="1" latinLnBrk="0" hangingPunct="1">
+              <a:spcBef>
+                <a:spcPct val="20000"/>
+              </a:spcBef>
+              <a:buClrTx/>
+              <a:buSzPct val="85000"/>
+              <a:buFont typeface="Courier New" pitchFamily="49" charset="0"/>
+              <a:buChar char="o"/>
+              <a:defRPr kumimoji="0" sz="2600" kern="1200">
+                <a:solidFill>
+                  <a:schemeClr val="tx1"/>
+                </a:solidFill>
+                <a:latin typeface="+mn-lt"/>
+                <a:ea typeface="+mn-ea"/>
+                <a:cs typeface="+mn-cs"/>
+              </a:defRPr>
+            </a:lvl2pPr>
+            <a:lvl3pPr marL="914400" indent="-246888" algn="l" rtl="0" eaLnBrk="1" latinLnBrk="0" hangingPunct="1">
+              <a:spcBef>
+                <a:spcPct val="20000"/>
+              </a:spcBef>
+              <a:buClrTx/>
+              <a:buSzPct val="70000"/>
+              <a:buFont typeface="Wingdings 2"/>
+              <a:buChar char=""/>
+              <a:defRPr kumimoji="0" sz="2400" kern="1200">
+                <a:solidFill>
+                  <a:schemeClr val="tx1"/>
+                </a:solidFill>
+                <a:latin typeface="+mn-lt"/>
+                <a:ea typeface="+mn-ea"/>
+                <a:cs typeface="+mn-cs"/>
+              </a:defRPr>
+            </a:lvl3pPr>
+            <a:lvl4pPr marL="1188720" indent="-210312" algn="l" rtl="0" eaLnBrk="1" latinLnBrk="0" hangingPunct="1">
+              <a:spcBef>
+                <a:spcPct val="20000"/>
+              </a:spcBef>
+              <a:buClrTx/>
+              <a:buSzPct val="65000"/>
+              <a:buFont typeface="Wingdings 2"/>
+              <a:buChar char=""/>
+              <a:defRPr kumimoji="0" sz="2000" kern="1200">
+                <a:solidFill>
+                  <a:schemeClr val="tx1"/>
+                </a:solidFill>
+                <a:latin typeface="+mn-lt"/>
+                <a:ea typeface="+mn-ea"/>
+                <a:cs typeface="+mn-cs"/>
+              </a:defRPr>
+            </a:lvl4pPr>
+            <a:lvl5pPr marL="1463040" indent="-210312" algn="l" rtl="0" eaLnBrk="1" latinLnBrk="0" hangingPunct="1">
+              <a:spcBef>
+                <a:spcPct val="20000"/>
+              </a:spcBef>
+              <a:buClrTx/>
+              <a:buSzPct val="65000"/>
+              <a:buFont typeface="Wingdings 2"/>
+              <a:buChar char=""/>
+              <a:defRPr kumimoji="0" sz="1800" kern="1200">
+                <a:solidFill>
+                  <a:schemeClr val="tx1"/>
+                </a:solidFill>
+                <a:latin typeface="+mn-lt"/>
+                <a:ea typeface="+mn-ea"/>
+                <a:cs typeface="+mn-cs"/>
+              </a:defRPr>
+            </a:lvl5pPr>
+            <a:lvl6pPr marL="1737360" indent="-210312" algn="l" rtl="0" eaLnBrk="1" latinLnBrk="0" hangingPunct="1">
+              <a:spcBef>
+                <a:spcPct val="20000"/>
+              </a:spcBef>
+              <a:buClr>
+                <a:schemeClr val="accent5"/>
+              </a:buClr>
+              <a:buSzPct val="80000"/>
+              <a:buFont typeface="Wingdings 2"/>
+              <a:buChar char=""/>
+              <a:defRPr kumimoji="0" sz="1800" kern="1200">
+                <a:solidFill>
+                  <a:schemeClr val="tx1"/>
+                </a:solidFill>
+                <a:latin typeface="+mn-lt"/>
+                <a:ea typeface="+mn-ea"/>
+                <a:cs typeface="+mn-cs"/>
+              </a:defRPr>
+            </a:lvl6pPr>
+            <a:lvl7pPr marL="1920240" indent="-182880" algn="l" rtl="0" eaLnBrk="1" latinLnBrk="0" hangingPunct="1">
+              <a:spcBef>
+                <a:spcPct val="20000"/>
+              </a:spcBef>
+              <a:buClr>
+                <a:schemeClr val="accent6"/>
+              </a:buClr>
+              <a:buSzPct val="80000"/>
+              <a:buFont typeface="Wingdings 2"/>
+              <a:buChar char=""/>
+              <a:defRPr kumimoji="0" sz="1600" kern="1200" baseline="0">
+                <a:solidFill>
+                  <a:schemeClr val="tx1"/>
+                </a:solidFill>
+                <a:latin typeface="+mn-lt"/>
+                <a:ea typeface="+mn-ea"/>
+                <a:cs typeface="+mn-cs"/>
+              </a:defRPr>
+            </a:lvl7pPr>
+            <a:lvl8pPr marL="2194560" indent="-182880" algn="l" rtl="0" eaLnBrk="1" latinLnBrk="0" hangingPunct="1">
+              <a:spcBef>
+                <a:spcPct val="20000"/>
+              </a:spcBef>
+              <a:buClr>
+                <a:schemeClr val="tx2"/>
+              </a:buClr>
+              <a:buChar char="•"/>
+              <a:defRPr kumimoji="0" sz="1600" kern="1200">
+                <a:solidFill>
+                  <a:schemeClr val="tx1"/>
+                </a:solidFill>
+                <a:latin typeface="+mn-lt"/>
+                <a:ea typeface="+mn-ea"/>
+                <a:cs typeface="+mn-cs"/>
+              </a:defRPr>
+            </a:lvl8pPr>
+            <a:lvl9pPr marL="2468880" indent="-182880" algn="l" rtl="0" eaLnBrk="1" latinLnBrk="0" hangingPunct="1">
+              <a:spcBef>
+                <a:spcPct val="20000"/>
+              </a:spcBef>
+              <a:buClr>
+                <a:schemeClr val="tx2"/>
+              </a:buClr>
+              <a:buFontTx/>
+              <a:buChar char="•"/>
+              <a:defRPr kumimoji="0" sz="1400" kern="1200" baseline="0">
+                <a:solidFill>
+                  <a:schemeClr val="tx1"/>
+                </a:solidFill>
+                <a:latin typeface="+mn-lt"/>
+                <a:ea typeface="+mn-ea"/>
+                <a:cs typeface="+mn-cs"/>
+              </a:defRPr>
+            </a:lvl9pPr>
+          </a:lstStyle>
+          <a:p>
+            <a:pPr marL="0" indent="0">
+              <a:buNone/>
+            </a:pPr>
+            <a:r>
+              <a:rPr lang="it-IT" dirty="0" smtClean="0"/>
+              <a:t>La decisione di usare questo </a:t>
+            </a:r>
+            <a:r>
+              <a:rPr lang="it-IT" b="1" dirty="0" smtClean="0"/>
+              <a:t>Design </a:t>
+            </a:r>
+            <a:r>
+              <a:rPr lang="it-IT" b="1" dirty="0" err="1" smtClean="0"/>
+              <a:t>Patter</a:t>
+            </a:r>
+            <a:r>
+              <a:rPr lang="it-IT" b="1" dirty="0" smtClean="0"/>
+              <a:t> </a:t>
+            </a:r>
+            <a:r>
+              <a:rPr lang="it-IT" dirty="0" smtClean="0"/>
+              <a:t>deriva della possibilità di effettuare una </a:t>
+            </a:r>
+            <a:r>
+              <a:rPr lang="it-IT" dirty="0" smtClean="0"/>
+              <a:t>ricerca avanzata </a:t>
+            </a:r>
+            <a:r>
+              <a:rPr lang="it-IT" b="1" dirty="0" smtClean="0"/>
+              <a:t>da</a:t>
+            </a:r>
+            <a:r>
+              <a:rPr lang="it-IT" dirty="0" smtClean="0"/>
+              <a:t> </a:t>
+            </a:r>
+            <a:r>
+              <a:rPr lang="it-IT" dirty="0" smtClean="0"/>
+              <a:t>una particolare tipologia specifica di utente </a:t>
+            </a:r>
+            <a:r>
+              <a:rPr lang="it-IT" b="1" dirty="0" smtClean="0"/>
+              <a:t>su</a:t>
+            </a:r>
+            <a:r>
+              <a:rPr lang="it-IT" dirty="0" smtClean="0"/>
+              <a:t> un altro specifico utente. </a:t>
+            </a:r>
+            <a:r>
+              <a:rPr lang="it-IT" dirty="0" smtClean="0"/>
+              <a:t>Quindi </a:t>
+            </a:r>
+            <a:r>
+              <a:rPr lang="it-IT" dirty="0" smtClean="0"/>
+              <a:t>come </a:t>
+            </a:r>
+            <a:r>
+              <a:rPr lang="it-IT" b="1" dirty="0" smtClean="0"/>
+              <a:t>primo passo </a:t>
+            </a:r>
+            <a:r>
+              <a:rPr lang="it-IT" dirty="0" smtClean="0"/>
+              <a:t>è stato creato </a:t>
+            </a:r>
+            <a:r>
+              <a:rPr lang="it-IT" b="1" dirty="0" err="1" smtClean="0"/>
+              <a:t>ContestoRicerca</a:t>
+            </a:r>
+            <a:r>
+              <a:rPr lang="it-IT" dirty="0" smtClean="0"/>
+              <a:t> per selezionare la tipologia di ricerca che si andrà ad effettuare e il contesto in cui si </a:t>
+            </a:r>
+            <a:r>
+              <a:rPr lang="it-IT" dirty="0" smtClean="0"/>
+              <a:t>farà. Il </a:t>
+            </a:r>
+            <a:r>
+              <a:rPr lang="it-IT" b="1" dirty="0" smtClean="0"/>
+              <a:t>secondo passo </a:t>
+            </a:r>
+            <a:r>
+              <a:rPr lang="it-IT" dirty="0" smtClean="0"/>
+              <a:t>è </a:t>
+            </a:r>
+            <a:r>
+              <a:rPr lang="it-IT" dirty="0" smtClean="0"/>
+              <a:t>la creazione della classe </a:t>
+            </a:r>
+            <a:r>
+              <a:rPr lang="it-IT" b="1" dirty="0" err="1" smtClean="0"/>
+              <a:t>AlgoritmoRicerca</a:t>
+            </a:r>
+            <a:r>
+              <a:rPr lang="it-IT" dirty="0" smtClean="0"/>
+              <a:t> che, in base al tipo di utente da ricercare effettua una ricerca specifica, con un algoritmo specifico. </a:t>
+            </a:r>
+            <a:endParaRPr lang="it-IT" dirty="0" smtClean="0"/>
+          </a:p>
+          <a:p>
+            <a:pPr marL="0" indent="0">
+              <a:buNone/>
+            </a:pPr>
+            <a:endParaRPr lang="it-IT" dirty="0" smtClean="0"/>
+          </a:p>
+          <a:p>
+            <a:pPr marL="0" indent="0">
+              <a:buNone/>
+            </a:pPr>
+            <a:endParaRPr lang="en-US" dirty="0"/>
+          </a:p>
+        </p:txBody>
+      </p:sp>
+    </p:spTree>
+    <p:extLst>
+      <p:ext uri="{BB962C8B-B14F-4D97-AF65-F5344CB8AC3E}">
+        <p14:creationId xmlns="" xmlns:p14="http://schemas.microsoft.com/office/powerpoint/2010/main" val="155874689"/>
+      </p:ext>
+    </p:extLst>
+  </p:cSld>
+  <p:clrMapOvr>
+    <a:masterClrMapping/>
+  </p:clrMapOvr>
+  <mc:AlternateContent xmlns:mc="http://schemas.openxmlformats.org/markup-compatibility/2006">
+    <mc:Choice xmlns="" xmlns:p14="http://schemas.microsoft.com/office/powerpoint/2010/main" Requires="p14">
+      <p:transition spd="slow" p14:dur="2000"/>
+    </mc:Choice>
+    <mc:Fallback>
+      <p:transition spd="slow"/>
+    </mc:Fallback>
+  </mc:AlternateContent>
+  <p:timing>
+    <p:tnLst>
+      <p:par>
+        <p:cTn id="1" dur="indefinite" restart="never" nodeType="tmRoot"/>
+      </p:par>
+    </p:tnLst>
+  </p:timing>
+</p:sld>
+</file>
+
+<file path=ppt/slides/slide17.xml><?xml version="1.0" encoding="utf-8"?>
+<p:sld xmlns:a="http://schemas.openxmlformats.org/drawingml/2006/main" xmlns:r="http://schemas.openxmlformats.org/officeDocument/2006/relationships" xmlns:p="http://schemas.openxmlformats.org/presentationml/2006/main">
+  <p:cSld>
+    <p:spTree>
+      <p:nvGrpSpPr>
+        <p:cNvPr id="1" name=""/>
+        <p:cNvGrpSpPr/>
+        <p:nvPr/>
+      </p:nvGrpSpPr>
+      <p:grpSpPr>
+        <a:xfrm>
+          <a:off x="0" y="0"/>
+          <a:ext cx="0" cy="0"/>
+          <a:chOff x="0" y="0"/>
+          <a:chExt cx="0" cy="0"/>
+        </a:xfrm>
+      </p:grpSpPr>
+      <p:sp>
+        <p:nvSpPr>
+          <p:cNvPr id="2" name="CasellaDiTesto 1"/>
+          <p:cNvSpPr txBox="1"/>
+          <p:nvPr/>
+        </p:nvSpPr>
+        <p:spPr>
+          <a:xfrm>
+            <a:off x="2456097" y="476672"/>
+            <a:ext cx="4546758" cy="1538883"/>
+          </a:xfrm>
+          <a:prstGeom prst="rect">
+            <a:avLst/>
+          </a:prstGeom>
+          <a:noFill/>
+        </p:spPr>
+        <p:txBody>
+          <a:bodyPr wrap="none" rtlCol="0">
+            <a:spAutoFit/>
+          </a:bodyPr>
+          <a:lstStyle/>
+          <a:p>
+            <a:pPr algn="ctr"/>
+            <a:r>
+              <a:rPr lang="it-IT" sz="4800" b="1" dirty="0" err="1" smtClean="0">
+                <a:latin typeface="+mj-lt"/>
+              </a:rPr>
+              <a:t>Application</a:t>
+            </a:r>
+            <a:r>
+              <a:rPr lang="it-IT" sz="4800" b="1" dirty="0" smtClean="0">
+                <a:latin typeface="+mj-lt"/>
+              </a:rPr>
+              <a:t> </a:t>
+            </a:r>
+          </a:p>
+          <a:p>
+            <a:pPr algn="ctr"/>
+            <a:r>
+              <a:rPr lang="it-IT" sz="2800" b="1" dirty="0" err="1" smtClean="0">
+                <a:latin typeface="+mj-lt"/>
+              </a:rPr>
+              <a:t>Strategy</a:t>
+            </a:r>
+            <a:r>
+              <a:rPr lang="it-IT" sz="2800" b="1" dirty="0" smtClean="0">
+                <a:latin typeface="+mj-lt"/>
+              </a:rPr>
+              <a:t> Pattern: Motivazioni</a:t>
+            </a:r>
+            <a:endParaRPr lang="it-IT" sz="2800" b="1" dirty="0" smtClean="0">
+              <a:latin typeface="+mj-lt"/>
+            </a:endParaRPr>
+          </a:p>
+          <a:p>
+            <a:pPr algn="ctr"/>
+            <a:endParaRPr lang="it-IT" dirty="0">
+              <a:latin typeface="+mj-lt"/>
+            </a:endParaRPr>
+          </a:p>
+        </p:txBody>
+      </p:sp>
+      <p:sp>
+        <p:nvSpPr>
+          <p:cNvPr id="4" name="Content Placeholder 3"/>
+          <p:cNvSpPr txBox="1">
+            <a:spLocks/>
+          </p:cNvSpPr>
+          <p:nvPr/>
+        </p:nvSpPr>
+        <p:spPr>
+          <a:xfrm>
+            <a:off x="611560" y="2492896"/>
+            <a:ext cx="8208912" cy="3865896"/>
+          </a:xfrm>
+          <a:prstGeom prst="rect">
+            <a:avLst/>
+          </a:prstGeom>
+        </p:spPr>
+        <p:txBody>
+          <a:bodyPr tIns="0"/>
+          <a:lstStyle>
+            <a:lvl1pPr marL="274320" indent="-274320" algn="l" rtl="0" eaLnBrk="1" latinLnBrk="0" hangingPunct="1">
+              <a:spcBef>
+                <a:spcPct val="20000"/>
+              </a:spcBef>
+              <a:buClrTx/>
+              <a:buSzPct val="95000"/>
+              <a:buFont typeface="Wingdings" pitchFamily="2" charset="2"/>
+              <a:buChar char="v"/>
+              <a:defRPr kumimoji="0" sz="2800" kern="1200">
+                <a:solidFill>
+                  <a:schemeClr val="tx1"/>
+                </a:solidFill>
+                <a:latin typeface="+mn-lt"/>
+                <a:ea typeface="+mn-ea"/>
+                <a:cs typeface="+mn-cs"/>
+              </a:defRPr>
+            </a:lvl1pPr>
+            <a:lvl2pPr marL="640080" indent="-246888" algn="l" rtl="0" eaLnBrk="1" latinLnBrk="0" hangingPunct="1">
+              <a:spcBef>
+                <a:spcPct val="20000"/>
+              </a:spcBef>
+              <a:buClrTx/>
+              <a:buSzPct val="85000"/>
+              <a:buFont typeface="Courier New" pitchFamily="49" charset="0"/>
+              <a:buChar char="o"/>
+              <a:defRPr kumimoji="0" sz="2600" kern="1200">
+                <a:solidFill>
+                  <a:schemeClr val="tx1"/>
+                </a:solidFill>
+                <a:latin typeface="+mn-lt"/>
+                <a:ea typeface="+mn-ea"/>
+                <a:cs typeface="+mn-cs"/>
+              </a:defRPr>
+            </a:lvl2pPr>
+            <a:lvl3pPr marL="914400" indent="-246888" algn="l" rtl="0" eaLnBrk="1" latinLnBrk="0" hangingPunct="1">
+              <a:spcBef>
+                <a:spcPct val="20000"/>
+              </a:spcBef>
+              <a:buClrTx/>
+              <a:buSzPct val="70000"/>
+              <a:buFont typeface="Wingdings 2"/>
+              <a:buChar char=""/>
+              <a:defRPr kumimoji="0" sz="2400" kern="1200">
+                <a:solidFill>
+                  <a:schemeClr val="tx1"/>
+                </a:solidFill>
+                <a:latin typeface="+mn-lt"/>
+                <a:ea typeface="+mn-ea"/>
+                <a:cs typeface="+mn-cs"/>
+              </a:defRPr>
+            </a:lvl3pPr>
+            <a:lvl4pPr marL="1188720" indent="-210312" algn="l" rtl="0" eaLnBrk="1" latinLnBrk="0" hangingPunct="1">
+              <a:spcBef>
+                <a:spcPct val="20000"/>
+              </a:spcBef>
+              <a:buClrTx/>
+              <a:buSzPct val="65000"/>
+              <a:buFont typeface="Wingdings 2"/>
+              <a:buChar char=""/>
+              <a:defRPr kumimoji="0" sz="2000" kern="1200">
+                <a:solidFill>
+                  <a:schemeClr val="tx1"/>
+                </a:solidFill>
+                <a:latin typeface="+mn-lt"/>
+                <a:ea typeface="+mn-ea"/>
+                <a:cs typeface="+mn-cs"/>
+              </a:defRPr>
+            </a:lvl4pPr>
+            <a:lvl5pPr marL="1463040" indent="-210312" algn="l" rtl="0" eaLnBrk="1" latinLnBrk="0" hangingPunct="1">
+              <a:spcBef>
+                <a:spcPct val="20000"/>
+              </a:spcBef>
+              <a:buClrTx/>
+              <a:buSzPct val="65000"/>
+              <a:buFont typeface="Wingdings 2"/>
+              <a:buChar char=""/>
+              <a:defRPr kumimoji="0" sz="1800" kern="1200">
+                <a:solidFill>
+                  <a:schemeClr val="tx1"/>
+                </a:solidFill>
+                <a:latin typeface="+mn-lt"/>
+                <a:ea typeface="+mn-ea"/>
+                <a:cs typeface="+mn-cs"/>
+              </a:defRPr>
+            </a:lvl5pPr>
+            <a:lvl6pPr marL="1737360" indent="-210312" algn="l" rtl="0" eaLnBrk="1" latinLnBrk="0" hangingPunct="1">
+              <a:spcBef>
+                <a:spcPct val="20000"/>
+              </a:spcBef>
+              <a:buClr>
+                <a:schemeClr val="accent5"/>
+              </a:buClr>
+              <a:buSzPct val="80000"/>
+              <a:buFont typeface="Wingdings 2"/>
+              <a:buChar char=""/>
+              <a:defRPr kumimoji="0" sz="1800" kern="1200">
+                <a:solidFill>
+                  <a:schemeClr val="tx1"/>
+                </a:solidFill>
+                <a:latin typeface="+mn-lt"/>
+                <a:ea typeface="+mn-ea"/>
+                <a:cs typeface="+mn-cs"/>
+              </a:defRPr>
+            </a:lvl6pPr>
+            <a:lvl7pPr marL="1920240" indent="-182880" algn="l" rtl="0" eaLnBrk="1" latinLnBrk="0" hangingPunct="1">
+              <a:spcBef>
+                <a:spcPct val="20000"/>
+              </a:spcBef>
+              <a:buClr>
+                <a:schemeClr val="accent6"/>
+              </a:buClr>
+              <a:buSzPct val="80000"/>
+              <a:buFont typeface="Wingdings 2"/>
+              <a:buChar char=""/>
+              <a:defRPr kumimoji="0" sz="1600" kern="1200" baseline="0">
+                <a:solidFill>
+                  <a:schemeClr val="tx1"/>
+                </a:solidFill>
+                <a:latin typeface="+mn-lt"/>
+                <a:ea typeface="+mn-ea"/>
+                <a:cs typeface="+mn-cs"/>
+              </a:defRPr>
+            </a:lvl7pPr>
+            <a:lvl8pPr marL="2194560" indent="-182880" algn="l" rtl="0" eaLnBrk="1" latinLnBrk="0" hangingPunct="1">
+              <a:spcBef>
+                <a:spcPct val="20000"/>
+              </a:spcBef>
+              <a:buClr>
+                <a:schemeClr val="tx2"/>
+              </a:buClr>
+              <a:buChar char="•"/>
+              <a:defRPr kumimoji="0" sz="1600" kern="1200">
+                <a:solidFill>
+                  <a:schemeClr val="tx1"/>
+                </a:solidFill>
+                <a:latin typeface="+mn-lt"/>
+                <a:ea typeface="+mn-ea"/>
+                <a:cs typeface="+mn-cs"/>
+              </a:defRPr>
+            </a:lvl8pPr>
+            <a:lvl9pPr marL="2468880" indent="-182880" algn="l" rtl="0" eaLnBrk="1" latinLnBrk="0" hangingPunct="1">
+              <a:spcBef>
+                <a:spcPct val="20000"/>
+              </a:spcBef>
+              <a:buClr>
+                <a:schemeClr val="tx2"/>
+              </a:buClr>
+              <a:buFontTx/>
+              <a:buChar char="•"/>
+              <a:defRPr kumimoji="0" sz="1400" kern="1200" baseline="0">
+                <a:solidFill>
+                  <a:schemeClr val="tx1"/>
+                </a:solidFill>
+                <a:latin typeface="+mn-lt"/>
+                <a:ea typeface="+mn-ea"/>
+                <a:cs typeface="+mn-cs"/>
+              </a:defRPr>
+            </a:lvl9pPr>
+          </a:lstStyle>
+          <a:p>
+            <a:pPr marL="0" indent="0">
+              <a:buNone/>
+            </a:pPr>
+            <a:r>
+              <a:rPr lang="it-IT" dirty="0" smtClean="0"/>
+              <a:t>Questo perché gli </a:t>
+            </a:r>
+            <a:r>
+              <a:rPr lang="it-IT" dirty="0" smtClean="0"/>
+              <a:t>utenti che effettuano la ricerca vedono alcuni dati o tutti, in base al tipo di utente </a:t>
+            </a:r>
+            <a:r>
+              <a:rPr lang="it-IT" dirty="0" smtClean="0"/>
+              <a:t>e </a:t>
+            </a:r>
+            <a:r>
+              <a:rPr lang="it-IT" dirty="0" smtClean="0"/>
+              <a:t>gli </a:t>
+            </a:r>
+            <a:r>
+              <a:rPr lang="it-IT" dirty="0" smtClean="0"/>
+              <a:t>utenti </a:t>
+            </a:r>
+            <a:r>
+              <a:rPr lang="it-IT" dirty="0" smtClean="0"/>
+              <a:t>ti ricercati su cui viene effettuata la ricerca hanno dati differenti in base al tipo di utente. </a:t>
+            </a:r>
+            <a:endParaRPr lang="it-IT" dirty="0" smtClean="0"/>
+          </a:p>
+          <a:p>
+            <a:pPr marL="0" indent="0">
+              <a:buNone/>
+            </a:pPr>
+            <a:endParaRPr lang="it-IT" dirty="0" smtClean="0"/>
+          </a:p>
+          <a:p>
+            <a:pPr marL="0" indent="0">
+              <a:buNone/>
+            </a:pPr>
+            <a:endParaRPr lang="en-US" dirty="0"/>
+          </a:p>
+        </p:txBody>
+      </p:sp>
+    </p:spTree>
+    <p:extLst>
+      <p:ext uri="{BB962C8B-B14F-4D97-AF65-F5344CB8AC3E}">
+        <p14:creationId xmlns="" xmlns:p14="http://schemas.microsoft.com/office/powerpoint/2010/main" val="155874689"/>
+      </p:ext>
+    </p:extLst>
+  </p:cSld>
+  <p:clrMapOvr>
+    <a:masterClrMapping/>
+  </p:clrMapOvr>
+  <mc:AlternateContent xmlns:mc="http://schemas.openxmlformats.org/markup-compatibility/2006">
+    <mc:Choice xmlns="" xmlns:p14="http://schemas.microsoft.com/office/powerpoint/2010/main" Requires="p14">
+      <p:transition spd="slow" p14:dur="2000"/>
+    </mc:Choice>
+    <mc:Fallback>
+      <p:transition spd="slow"/>
+    </mc:Fallback>
+  </mc:AlternateContent>
+  <p:timing>
+    <p:tnLst>
+      <p:par>
+        <p:cTn id="1" dur="indefinite" restart="never" nodeType="tmRoot"/>
+      </p:par>
+    </p:tnLst>
+  </p:timing>
+</p:sld>
+</file>
+
+<file path=ppt/slides/slide18.xml><?xml version="1.0" encoding="utf-8"?>
+<p:sld xmlns:a="http://schemas.openxmlformats.org/drawingml/2006/main" xmlns:r="http://schemas.openxmlformats.org/officeDocument/2006/relationships" xmlns:p="http://schemas.openxmlformats.org/presentationml/2006/main">
+  <p:cSld>
+    <p:spTree>
+      <p:nvGrpSpPr>
+        <p:cNvPr id="1" name=""/>
+        <p:cNvGrpSpPr/>
+        <p:nvPr/>
+      </p:nvGrpSpPr>
+      <p:grpSpPr>
+        <a:xfrm>
+          <a:off x="0" y="0"/>
+          <a:ext cx="0" cy="0"/>
+          <a:chOff x="0" y="0"/>
+          <a:chExt cx="0" cy="0"/>
+        </a:xfrm>
+      </p:grpSpPr>
+      <p:sp>
+        <p:nvSpPr>
+          <p:cNvPr id="2" name="CasellaDiTesto 1"/>
+          <p:cNvSpPr txBox="1"/>
+          <p:nvPr/>
+        </p:nvSpPr>
+        <p:spPr>
+          <a:xfrm>
+            <a:off x="2804687" y="476672"/>
+            <a:ext cx="3849580" cy="1538883"/>
+          </a:xfrm>
+          <a:prstGeom prst="rect">
+            <a:avLst/>
+          </a:prstGeom>
+          <a:noFill/>
+        </p:spPr>
+        <p:txBody>
+          <a:bodyPr wrap="none" rtlCol="0">
+            <a:spAutoFit/>
+          </a:bodyPr>
+          <a:lstStyle/>
+          <a:p>
+            <a:pPr algn="ctr"/>
+            <a:r>
+              <a:rPr lang="it-IT" sz="4800" b="1" dirty="0" err="1" smtClean="0">
+                <a:latin typeface="+mj-lt"/>
+              </a:rPr>
+              <a:t>Application</a:t>
+            </a:r>
+            <a:r>
+              <a:rPr lang="it-IT" sz="4800" b="1" dirty="0" smtClean="0">
+                <a:latin typeface="+mj-lt"/>
+              </a:rPr>
+              <a:t> </a:t>
+            </a:r>
+          </a:p>
+          <a:p>
+            <a:pPr algn="ctr"/>
+            <a:r>
+              <a:rPr lang="it-IT" sz="2800" b="1" dirty="0" err="1" smtClean="0">
+                <a:latin typeface="+mj-lt"/>
+              </a:rPr>
+              <a:t>Strategy</a:t>
+            </a:r>
+            <a:r>
+              <a:rPr lang="it-IT" sz="2800" b="1" dirty="0" smtClean="0">
+                <a:latin typeface="+mj-lt"/>
+              </a:rPr>
+              <a:t> Pattern: Grafico</a:t>
+            </a:r>
+            <a:endParaRPr lang="it-IT" sz="2800" b="1" dirty="0" smtClean="0">
+              <a:latin typeface="+mj-lt"/>
+            </a:endParaRPr>
+          </a:p>
+          <a:p>
+            <a:pPr algn="ctr"/>
+            <a:endParaRPr lang="it-IT" dirty="0">
+              <a:latin typeface="+mj-lt"/>
+            </a:endParaRPr>
+          </a:p>
+        </p:txBody>
+      </p:sp>
+      <p:pic>
+        <p:nvPicPr>
+          <p:cNvPr id="1026" name="Picture 2"/>
+          <p:cNvPicPr>
+            <a:picLocks noChangeAspect="1" noChangeArrowheads="1"/>
+          </p:cNvPicPr>
+          <p:nvPr/>
+        </p:nvPicPr>
+        <p:blipFill>
+          <a:blip r:embed="rId2" cstate="print"/>
+          <a:srcRect/>
+          <a:stretch>
+            <a:fillRect/>
+          </a:stretch>
+        </p:blipFill>
+        <p:spPr bwMode="auto">
+          <a:xfrm>
+            <a:off x="216025" y="1844824"/>
+            <a:ext cx="8676455" cy="4590407"/>
+          </a:xfrm>
+          <a:prstGeom prst="rect">
+            <a:avLst/>
+          </a:prstGeom>
+          <a:noFill/>
+          <a:ln w="9525">
+            <a:noFill/>
+            <a:miter lim="800000"/>
+            <a:headEnd/>
+            <a:tailEnd/>
+          </a:ln>
+        </p:spPr>
+      </p:pic>
+    </p:spTree>
+    <p:extLst>
+      <p:ext uri="{BB962C8B-B14F-4D97-AF65-F5344CB8AC3E}">
+        <p14:creationId xmlns="" xmlns:p14="http://schemas.microsoft.com/office/powerpoint/2010/main" val="155874689"/>
+      </p:ext>
+    </p:extLst>
+  </p:cSld>
+  <p:clrMapOvr>
+    <a:masterClrMapping/>
+  </p:clrMapOvr>
+  <mc:AlternateContent xmlns:mc="http://schemas.openxmlformats.org/markup-compatibility/2006">
+    <mc:Choice xmlns="" xmlns:p14="http://schemas.microsoft.com/office/powerpoint/2010/main" Requires="p14">
+      <p:transition spd="slow" p14:dur="2000"/>
+    </mc:Choice>
+    <mc:Fallback>
+      <p:transition spd="slow"/>
+    </mc:Fallback>
+  </mc:AlternateContent>
+  <p:timing>
+    <p:tnLst>
+      <p:par>
+        <p:cTn id="1" dur="indefinite" restart="never" nodeType="tmRoot"/>
+      </p:par>
+    </p:tnLst>
+  </p:timing>
+</p:sld>
+</file>
+
+<file path=ppt/slides/slide19.xml><?xml version="1.0" encoding="utf-8"?>
+<p:sld xmlns:a="http://schemas.openxmlformats.org/drawingml/2006/main" xmlns:r="http://schemas.openxmlformats.org/officeDocument/2006/relationships" xmlns:p="http://schemas.openxmlformats.org/presentationml/2006/main">
+  <p:cSld>
+    <p:spTree>
+      <p:nvGrpSpPr>
+        <p:cNvPr id="1" name=""/>
+        <p:cNvGrpSpPr/>
+        <p:nvPr/>
+      </p:nvGrpSpPr>
+      <p:grpSpPr>
+        <a:xfrm>
+          <a:off x="0" y="0"/>
+          <a:ext cx="0" cy="0"/>
+          <a:chOff x="0" y="0"/>
+          <a:chExt cx="0" cy="0"/>
+        </a:xfrm>
+      </p:grpSpPr>
+      <p:sp>
+        <p:nvSpPr>
+          <p:cNvPr id="2" name="CasellaDiTesto 1"/>
+          <p:cNvSpPr txBox="1"/>
+          <p:nvPr/>
+        </p:nvSpPr>
+        <p:spPr>
+          <a:xfrm>
+            <a:off x="2872652" y="476672"/>
+            <a:ext cx="3713645" cy="1538883"/>
+          </a:xfrm>
+          <a:prstGeom prst="rect">
+            <a:avLst/>
+          </a:prstGeom>
+          <a:noFill/>
+        </p:spPr>
+        <p:txBody>
+          <a:bodyPr wrap="none" rtlCol="0">
+            <a:spAutoFit/>
+          </a:bodyPr>
+          <a:lstStyle/>
+          <a:p>
+            <a:pPr algn="ctr"/>
+            <a:r>
+              <a:rPr lang="it-IT" sz="4800" b="1" dirty="0" err="1" smtClean="0">
+                <a:latin typeface="+mj-lt"/>
+              </a:rPr>
+              <a:t>Applications</a:t>
+            </a:r>
+            <a:endParaRPr lang="it-IT" sz="4800" b="1" dirty="0" smtClean="0">
+              <a:latin typeface="+mj-lt"/>
+            </a:endParaRPr>
+          </a:p>
+          <a:p>
+            <a:pPr algn="ctr"/>
+            <a:r>
+              <a:rPr lang="it-IT" sz="2800" b="1" dirty="0" smtClean="0">
+                <a:latin typeface="+mj-lt"/>
+              </a:rPr>
+              <a:t>Gestione Notifiche Mail</a:t>
+            </a:r>
+            <a:endParaRPr lang="it-IT" sz="2800" b="1" dirty="0" smtClean="0">
+              <a:latin typeface="+mj-lt"/>
+            </a:endParaRPr>
+          </a:p>
+          <a:p>
+            <a:pPr algn="ctr"/>
+            <a:endParaRPr lang="it-IT" dirty="0">
+              <a:latin typeface="+mj-lt"/>
+            </a:endParaRPr>
           </a:p>
         </p:txBody>
       </p:sp>
@@ -4949,8 +7718,8 @@
         </p:nvSpPr>
         <p:spPr>
           <a:xfrm>
-            <a:off x="323528" y="1795352"/>
-            <a:ext cx="5111750" cy="625536"/>
+            <a:off x="395536" y="2276872"/>
+            <a:ext cx="8352928" cy="3001800"/>
           </a:xfrm>
           <a:prstGeom prst="rect">
             <a:avLst/>
@@ -5123,78 +7892,209 @@
               <a:buNone/>
             </a:pPr>
             <a:r>
+              <a:rPr lang="en-US" dirty="0" smtClean="0"/>
+              <a:t>La </a:t>
+            </a:r>
+            <a:r>
+              <a:rPr lang="en-US" b="1" dirty="0" err="1" smtClean="0"/>
+              <a:t>Gesione</a:t>
+            </a:r>
+            <a:r>
+              <a:rPr lang="en-US" b="1" dirty="0" smtClean="0"/>
+              <a:t> </a:t>
+            </a:r>
+            <a:r>
+              <a:rPr lang="en-US" b="1" dirty="0" err="1" smtClean="0"/>
+              <a:t>Notifiche</a:t>
+            </a:r>
+            <a:r>
+              <a:rPr lang="en-US" b="1" dirty="0" smtClean="0"/>
+              <a:t> Mail </a:t>
+            </a:r>
+            <a:r>
               <a:rPr lang="en-US" dirty="0" err="1" smtClean="0"/>
-              <a:t>Testo</a:t>
+              <a:t>permette</a:t>
+            </a:r>
+            <a:r>
+              <a:rPr lang="en-US" dirty="0" smtClean="0"/>
+              <a:t> </a:t>
+            </a:r>
+            <a:r>
+              <a:rPr lang="en-US" dirty="0" err="1" smtClean="0"/>
+              <a:t>di</a:t>
+            </a:r>
+            <a:r>
+              <a:rPr lang="en-US" dirty="0" smtClean="0"/>
+              <a:t> </a:t>
+            </a:r>
+            <a:r>
+              <a:rPr lang="en-US" dirty="0" err="1" smtClean="0"/>
+              <a:t>inviare</a:t>
+            </a:r>
+            <a:r>
+              <a:rPr lang="en-US" dirty="0" smtClean="0"/>
+              <a:t> mail </a:t>
+            </a:r>
+            <a:r>
+              <a:rPr lang="en-US" dirty="0" err="1" smtClean="0"/>
+              <a:t>di</a:t>
+            </a:r>
+            <a:r>
+              <a:rPr lang="en-US" dirty="0" smtClean="0"/>
+              <a:t> </a:t>
+            </a:r>
+            <a:r>
+              <a:rPr lang="en-US" dirty="0" err="1" smtClean="0"/>
+              <a:t>notifica</a:t>
+            </a:r>
+            <a:r>
+              <a:rPr lang="en-US" dirty="0" smtClean="0"/>
+              <a:t> </a:t>
+            </a:r>
+            <a:r>
+              <a:rPr lang="en-US" dirty="0" err="1" smtClean="0"/>
+              <a:t>agli</a:t>
+            </a:r>
+            <a:r>
+              <a:rPr lang="en-US" dirty="0" smtClean="0"/>
+              <a:t> </a:t>
+            </a:r>
+            <a:r>
+              <a:rPr lang="en-US" dirty="0" err="1" smtClean="0"/>
+              <a:t>utenti</a:t>
+            </a:r>
+            <a:r>
+              <a:rPr lang="en-US" dirty="0" smtClean="0"/>
+              <a:t> del </a:t>
+            </a:r>
+            <a:r>
+              <a:rPr lang="en-US" dirty="0" err="1" smtClean="0"/>
+              <a:t>sistema</a:t>
+            </a:r>
+            <a:r>
+              <a:rPr lang="en-US" dirty="0" smtClean="0"/>
+              <a:t> in determinate </a:t>
+            </a:r>
+            <a:r>
+              <a:rPr lang="en-US" dirty="0" err="1" smtClean="0"/>
+              <a:t>situazioni</a:t>
+            </a:r>
+            <a:r>
+              <a:rPr lang="en-US" dirty="0" smtClean="0"/>
+              <a:t>, come ad </a:t>
+            </a:r>
+            <a:r>
+              <a:rPr lang="en-US" dirty="0" err="1" smtClean="0"/>
+              <a:t>esempio</a:t>
+            </a:r>
+            <a:r>
+              <a:rPr lang="en-US" dirty="0" smtClean="0"/>
+              <a:t> </a:t>
+            </a:r>
+            <a:r>
+              <a:rPr lang="en-US" dirty="0" err="1" smtClean="0"/>
+              <a:t>nella</a:t>
+            </a:r>
+            <a:r>
+              <a:rPr lang="en-US" dirty="0" smtClean="0"/>
+              <a:t> </a:t>
+            </a:r>
+            <a:r>
+              <a:rPr lang="en-US" dirty="0" err="1" smtClean="0"/>
+              <a:t>creazione</a:t>
+            </a:r>
+            <a:r>
+              <a:rPr lang="en-US" dirty="0" smtClean="0"/>
+              <a:t> </a:t>
+            </a:r>
+            <a:r>
+              <a:rPr lang="en-US" dirty="0" err="1" smtClean="0"/>
+              <a:t>di</a:t>
+            </a:r>
+            <a:r>
+              <a:rPr lang="en-US" dirty="0" smtClean="0"/>
+              <a:t> un account (per </a:t>
+            </a:r>
+            <a:r>
+              <a:rPr lang="en-US" dirty="0" err="1" smtClean="0"/>
+              <a:t>comunicare</a:t>
+            </a:r>
+            <a:r>
+              <a:rPr lang="en-US" dirty="0" smtClean="0"/>
+              <a:t> username e password) o </a:t>
+            </a:r>
+            <a:r>
+              <a:rPr lang="en-US" dirty="0" err="1" smtClean="0"/>
+              <a:t>nel</a:t>
+            </a:r>
+            <a:r>
+              <a:rPr lang="en-US" dirty="0" smtClean="0"/>
+              <a:t> </a:t>
+            </a:r>
+            <a:r>
+              <a:rPr lang="en-US" dirty="0" err="1" smtClean="0"/>
+              <a:t>licenziamento</a:t>
+            </a:r>
+            <a:r>
+              <a:rPr lang="en-US" dirty="0" smtClean="0"/>
+              <a:t> del </a:t>
+            </a:r>
+            <a:r>
+              <a:rPr lang="en-US" dirty="0" err="1" smtClean="0"/>
+              <a:t>personale</a:t>
+            </a:r>
+            <a:r>
+              <a:rPr lang="en-US" dirty="0" smtClean="0"/>
+              <a:t>, </a:t>
+            </a:r>
+            <a:r>
+              <a:rPr lang="en-US" dirty="0" err="1" smtClean="0"/>
+              <a:t>nella</a:t>
+            </a:r>
+            <a:r>
+              <a:rPr lang="en-US" dirty="0" smtClean="0"/>
+              <a:t> </a:t>
+            </a:r>
+            <a:r>
+              <a:rPr lang="en-US" dirty="0" err="1" smtClean="0"/>
+              <a:t>comunicazione</a:t>
+            </a:r>
+            <a:r>
+              <a:rPr lang="en-US" dirty="0" smtClean="0"/>
+              <a:t> </a:t>
+            </a:r>
+            <a:r>
+              <a:rPr lang="en-US" dirty="0" err="1" smtClean="0"/>
+              <a:t>di</a:t>
+            </a:r>
+            <a:r>
+              <a:rPr lang="en-US" dirty="0" smtClean="0"/>
+              <a:t> </a:t>
+            </a:r>
+            <a:r>
+              <a:rPr lang="en-US" dirty="0" err="1" smtClean="0"/>
+              <a:t>eventi</a:t>
+            </a:r>
+            <a:r>
+              <a:rPr lang="en-US" dirty="0" smtClean="0"/>
+              <a:t>, e </a:t>
+            </a:r>
+            <a:r>
+              <a:rPr lang="en-US" dirty="0" err="1" smtClean="0"/>
+              <a:t>altro</a:t>
+            </a:r>
+            <a:r>
+              <a:rPr lang="en-US" smtClean="0"/>
+              <a:t>. </a:t>
             </a:r>
             <a:endParaRPr lang="en-US" dirty="0"/>
-          </a:p>
-        </p:txBody>
-      </p:sp>
-      <p:sp>
-        <p:nvSpPr>
-          <p:cNvPr id="11" name="CasellaDiTesto 10"/>
-          <p:cNvSpPr txBox="1"/>
-          <p:nvPr/>
-        </p:nvSpPr>
-        <p:spPr>
-          <a:xfrm>
-            <a:off x="5148064" y="2204864"/>
-            <a:ext cx="3695499" cy="1477328"/>
-          </a:xfrm>
-          <a:prstGeom prst="rect">
-            <a:avLst/>
-          </a:prstGeom>
-          <a:noFill/>
-        </p:spPr>
-        <p:txBody>
-          <a:bodyPr wrap="none" rtlCol="0">
-            <a:spAutoFit/>
-          </a:bodyPr>
-          <a:lstStyle/>
-          <a:p>
-            <a:r>
-              <a:rPr lang="it-IT" dirty="0" smtClean="0"/>
-              <a:t>Copia incollare le due caselle di testo </a:t>
-            </a:r>
-          </a:p>
-          <a:p>
-            <a:r>
-              <a:rPr lang="it-IT" dirty="0" smtClean="0"/>
-              <a:t>A sinistra per inserire testo e indici </a:t>
-            </a:r>
-          </a:p>
-          <a:p>
-            <a:r>
-              <a:rPr lang="it-IT" dirty="0" smtClean="0"/>
-              <a:t>(il formato per queste caselle è già</a:t>
-            </a:r>
-          </a:p>
-          <a:p>
-            <a:r>
-              <a:rPr lang="it-IT" dirty="0" smtClean="0"/>
-              <a:t> selezionato</a:t>
-            </a:r>
-          </a:p>
-          <a:p>
-            <a:r>
-              <a:rPr lang="it-IT" dirty="0" smtClean="0"/>
-              <a:t>Come da </a:t>
-            </a:r>
-            <a:r>
-              <a:rPr lang="it-IT" dirty="0" err="1" smtClean="0"/>
-              <a:t>template</a:t>
-            </a:r>
-            <a:r>
-              <a:rPr lang="it-IT" dirty="0" smtClean="0"/>
-              <a:t>)</a:t>
-            </a:r>
           </a:p>
         </p:txBody>
       </p:sp>
     </p:spTree>
     <p:extLst>
       <p:ext uri="{BB962C8B-B14F-4D97-AF65-F5344CB8AC3E}">
-        <p14:creationId xmlns:p14="http://schemas.microsoft.com/office/powerpoint/2010/main" xmlns="" val="155874689"/>
+        <p14:creationId xmlns="" xmlns:p14="http://schemas.microsoft.com/office/powerpoint/2010/main" val="155874689"/>
       </p:ext>
     </p:extLst>
   </p:cSld>
@@ -5202,7 +8102,7 @@
     <a:masterClrMapping/>
   </p:clrMapOvr>
   <mc:AlternateContent xmlns:mc="http://schemas.openxmlformats.org/markup-compatibility/2006">
-    <mc:Choice xmlns:p14="http://schemas.microsoft.com/office/powerpoint/2010/main" xmlns="" Requires="p14">
+    <mc:Choice xmlns="" xmlns:p14="http://schemas.microsoft.com/office/powerpoint/2010/main" Requires="p14">
       <p:transition spd="slow" p14:dur="2000"/>
     </mc:Choice>
     <mc:Fallback>
@@ -5277,9 +8177,6 @@
               </a:rPr>
               <a:t>Gestioni individuate</a:t>
             </a:r>
-            <a:endParaRPr lang="it-IT" sz="2800" b="1" dirty="0" smtClean="0">
-              <a:latin typeface="+mj-lt"/>
-            </a:endParaRPr>
           </a:p>
           <a:p>
             <a:pPr algn="ctr"/>
@@ -5300,7 +8197,7 @@
         <p:spPr>
           <a:xfrm>
             <a:off x="467544" y="2204864"/>
-            <a:ext cx="7789293" cy="2353728"/>
+            <a:ext cx="7789293" cy="3528392"/>
           </a:xfrm>
           <a:prstGeom prst="rect">
             <a:avLst/>
@@ -5475,15 +8372,7 @@
             </a:r>
             <a:r>
               <a:rPr lang="it-IT" dirty="0" smtClean="0"/>
-              <a:t> : si occupa della gestione della logica applicativ</a:t>
-            </a:r>
-            <a:r>
-              <a:rPr lang="it-IT" dirty="0" smtClean="0"/>
-              <a:t>a del sistema. </a:t>
-            </a:r>
-            <a:r>
-              <a:rPr lang="it-IT" dirty="0" smtClean="0"/>
-              <a:t>Esso contiene gli </a:t>
+              <a:t> : si occupa della gestione della logica applicativa del sistema. Esso contiene gli </a:t>
             </a:r>
             <a:r>
               <a:rPr lang="it-IT" b="1" dirty="0" smtClean="0"/>
@@ -5499,13 +8388,8 @@
             </a:r>
             <a:r>
               <a:rPr lang="it-IT" dirty="0" smtClean="0"/>
-              <a:t> responsabili del flusso di controllo del </a:t>
-            </a:r>
-            <a:r>
-              <a:rPr lang="it-IT" dirty="0" smtClean="0"/>
-              <a:t>software. Gestioni:</a:t>
-            </a:r>
-            <a:endParaRPr lang="it-IT" dirty="0" smtClean="0"/>
+              <a:t> responsabili del flusso di controllo del software. Gestioni:</a:t>
+            </a:r>
           </a:p>
           <a:p>
             <a:pPr lvl="1"/>
@@ -5518,15 +8402,27 @@
             <a:pPr lvl="1"/>
             <a:r>
               <a:rPr lang="it-IT" dirty="0" smtClean="0"/>
-              <a:t>Gestione Ricerca</a:t>
-            </a:r>
+              <a:t>Gestione </a:t>
+            </a:r>
+            <a:r>
+              <a:rPr lang="it-IT" dirty="0" smtClean="0"/>
+              <a:t>Ricerca</a:t>
+            </a:r>
+          </a:p>
+          <a:p>
+            <a:pPr lvl="1"/>
+            <a:r>
+              <a:rPr lang="it-IT" dirty="0" smtClean="0"/>
+              <a:t>Gestione Notifiche Mail</a:t>
+            </a:r>
+            <a:endParaRPr lang="it-IT" dirty="0" smtClean="0"/>
           </a:p>
         </p:txBody>
       </p:sp>
     </p:spTree>
     <p:extLst>
       <p:ext uri="{BB962C8B-B14F-4D97-AF65-F5344CB8AC3E}">
-        <p14:creationId xmlns:p14="http://schemas.microsoft.com/office/powerpoint/2010/main" xmlns="" val="155874689"/>
+        <p14:creationId xmlns="" xmlns:p14="http://schemas.microsoft.com/office/powerpoint/2010/main" val="155874689"/>
       </p:ext>
     </p:extLst>
   </p:cSld>
@@ -5534,7 +8430,7 @@
     <a:masterClrMapping/>
   </p:clrMapOvr>
   <mc:AlternateContent xmlns:mc="http://schemas.openxmlformats.org/markup-compatibility/2006">
-    <mc:Choice xmlns:p14="http://schemas.microsoft.com/office/powerpoint/2010/main" xmlns="" Requires="p14">
+    <mc:Choice xmlns="" xmlns:p14="http://schemas.microsoft.com/office/powerpoint/2010/main" Requires="p14">
       <p:transition spd="slow" p14:dur="2000"/>
     </mc:Choice>
     <mc:Fallback>
@@ -5603,9 +8499,6 @@
               </a:rPr>
               <a:t> </a:t>
             </a:r>
-            <a:endParaRPr lang="it-IT" sz="4800" b="1" dirty="0" smtClean="0">
-              <a:latin typeface="+mj-lt"/>
-            </a:endParaRPr>
           </a:p>
           <a:p>
             <a:pPr algn="ctr"/>
@@ -5615,9 +8508,6 @@
               </a:rPr>
               <a:t>Gestione Utenti e Accessi</a:t>
             </a:r>
-            <a:endParaRPr lang="it-IT" sz="2800" b="1" dirty="0" smtClean="0">
-              <a:latin typeface="+mj-lt"/>
-            </a:endParaRPr>
           </a:p>
           <a:p>
             <a:pPr algn="ctr"/>
@@ -5629,7 +8519,7 @@
       </p:sp>
       <p:sp>
         <p:nvSpPr>
-          <p:cNvPr id="9" name="Content Placeholder 3"/>
+          <p:cNvPr id="4" name="Content Placeholder 3"/>
           <p:cNvSpPr txBox="1">
             <a:spLocks/>
           </p:cNvSpPr>
@@ -5637,8 +8527,8 @@
         </p:nvSpPr>
         <p:spPr>
           <a:xfrm>
-            <a:off x="323528" y="2132856"/>
-            <a:ext cx="8365358" cy="4032448"/>
+            <a:off x="539552" y="2420888"/>
+            <a:ext cx="8208912" cy="3865896"/>
           </a:xfrm>
           <a:prstGeom prst="rect">
             <a:avLst/>
@@ -5807,6 +8697,9 @@
             </a:lvl9pPr>
           </a:lstStyle>
           <a:p>
+            <a:pPr marL="0" indent="0">
+              <a:buNone/>
+            </a:pPr>
             <a:r>
               <a:rPr lang="it-IT" dirty="0" smtClean="0"/>
               <a:t>La </a:t>
@@ -5817,12 +8710,14 @@
             </a:r>
             <a:r>
               <a:rPr lang="it-IT" dirty="0" smtClean="0"/>
-              <a:t>si occupa di gestire gli accessi al sistema, gestire la registrazione, l'inserimento e la modifica di utenti nel sistema e gestire i pagamenti, il bando e le classi da assegnare.</a:t>
-            </a:r>
-            <a:r>
-              <a:rPr lang="it-IT" dirty="0" smtClean="0"/>
-              <a:t>  </a:t>
-            </a:r>
+              <a:t>si occupa di gestire gli accessi al sistema, gestire la registrazione, l'inserimento e la modifica di utenti nel sistema, dei bambini,delle loro domande di iscrizione e gestire i pagamenti, il bando e le classi da assegnare.  </a:t>
+            </a:r>
+            <a:endParaRPr lang="en-US" dirty="0" smtClean="0"/>
+          </a:p>
+          <a:p>
+            <a:pPr marL="0" indent="0">
+              <a:buNone/>
+            </a:pPr>
             <a:endParaRPr lang="en-US" dirty="0"/>
           </a:p>
         </p:txBody>
@@ -5830,7 +8725,7 @@
     </p:spTree>
     <p:extLst>
       <p:ext uri="{BB962C8B-B14F-4D97-AF65-F5344CB8AC3E}">
-        <p14:creationId xmlns:p14="http://schemas.microsoft.com/office/powerpoint/2010/main" xmlns="" val="155874689"/>
+        <p14:creationId xmlns="" xmlns:p14="http://schemas.microsoft.com/office/powerpoint/2010/main" val="155874689"/>
       </p:ext>
     </p:extLst>
   </p:cSld>
@@ -5838,7 +8733,7 @@
     <a:masterClrMapping/>
   </p:clrMapOvr>
   <mc:AlternateContent xmlns:mc="http://schemas.openxmlformats.org/markup-compatibility/2006">
-    <mc:Choice xmlns:p14="http://schemas.microsoft.com/office/powerpoint/2010/main" xmlns="" Requires="p14">
+    <mc:Choice xmlns="" xmlns:p14="http://schemas.microsoft.com/office/powerpoint/2010/main" Requires="p14">
       <p:transition spd="slow" p14:dur="2000"/>
     </mc:Choice>
     <mc:Fallback>
@@ -5907,9 +8802,6 @@
               </a:rPr>
               <a:t> </a:t>
             </a:r>
-            <a:endParaRPr lang="it-IT" sz="4800" b="1" dirty="0" smtClean="0">
-              <a:latin typeface="+mj-lt"/>
-            </a:endParaRPr>
           </a:p>
           <a:p>
             <a:pPr algn="ctr"/>
@@ -6221,7 +9113,7 @@
     </p:spTree>
     <p:extLst>
       <p:ext uri="{BB962C8B-B14F-4D97-AF65-F5344CB8AC3E}">
-        <p14:creationId xmlns:p14="http://schemas.microsoft.com/office/powerpoint/2010/main" xmlns="" val="155874689"/>
+        <p14:creationId xmlns="" xmlns:p14="http://schemas.microsoft.com/office/powerpoint/2010/main" val="155874689"/>
       </p:ext>
     </p:extLst>
   </p:cSld>
@@ -6229,7 +9121,7 @@
     <a:masterClrMapping/>
   </p:clrMapOvr>
   <mc:AlternateContent xmlns:mc="http://schemas.openxmlformats.org/markup-compatibility/2006">
-    <mc:Choice xmlns:p14="http://schemas.microsoft.com/office/powerpoint/2010/main" xmlns="" Requires="p14">
+    <mc:Choice xmlns="" xmlns:p14="http://schemas.microsoft.com/office/powerpoint/2010/main" Requires="p14">
       <p:transition spd="slow" p14:dur="2000"/>
     </mc:Choice>
     <mc:Fallback>
@@ -6310,9 +9202,6 @@
               </a:rPr>
               <a:t> Login</a:t>
             </a:r>
-            <a:endParaRPr lang="it-IT" sz="2800" b="1" dirty="0" smtClean="0">
-              <a:latin typeface="+mj-lt"/>
-            </a:endParaRPr>
           </a:p>
           <a:p>
             <a:pPr algn="ctr"/>
@@ -6639,11 +9528,7 @@
             </a:r>
             <a:r>
               <a:rPr lang="en-US" dirty="0" smtClean="0"/>
-              <a:t> </a:t>
-            </a:r>
-            <a:r>
-              <a:rPr lang="en-US" dirty="0" smtClean="0"/>
-              <a:t>Account  </a:t>
+              <a:t> Account  </a:t>
             </a:r>
             <a:r>
               <a:rPr lang="en-US" dirty="0" err="1" smtClean="0"/>
@@ -6716,7 +9601,7 @@
     </p:spTree>
     <p:extLst>
       <p:ext uri="{BB962C8B-B14F-4D97-AF65-F5344CB8AC3E}">
-        <p14:creationId xmlns:p14="http://schemas.microsoft.com/office/powerpoint/2010/main" xmlns="" val="155874689"/>
+        <p14:creationId xmlns="" xmlns:p14="http://schemas.microsoft.com/office/powerpoint/2010/main" val="155874689"/>
       </p:ext>
     </p:extLst>
   </p:cSld>
@@ -6724,7 +9609,7 @@
     <a:masterClrMapping/>
   </p:clrMapOvr>
   <mc:AlternateContent xmlns:mc="http://schemas.openxmlformats.org/markup-compatibility/2006">
-    <mc:Choice xmlns:p14="http://schemas.microsoft.com/office/powerpoint/2010/main" xmlns="" Requires="p14">
+    <mc:Choice xmlns="" xmlns:p14="http://schemas.microsoft.com/office/powerpoint/2010/main" Requires="p14">
       <p:transition spd="slow" p14:dur="2000"/>
     </mc:Choice>
     <mc:Fallback>
@@ -6766,8 +9651,8 @@
         </p:nvSpPr>
         <p:spPr>
           <a:xfrm>
-            <a:off x="3110925" y="476672"/>
-            <a:ext cx="3237105" cy="1538883"/>
+            <a:off x="3011858" y="476672"/>
+            <a:ext cx="3435236" cy="1538883"/>
           </a:xfrm>
           <a:prstGeom prst="rect">
             <a:avLst/>
@@ -6793,9 +9678,6 @@
               </a:rPr>
               <a:t> </a:t>
             </a:r>
-            <a:endParaRPr lang="it-IT" sz="4800" b="1" dirty="0" smtClean="0">
-              <a:latin typeface="+mj-lt"/>
-            </a:endParaRPr>
           </a:p>
           <a:p>
             <a:pPr algn="ctr"/>
@@ -6809,7 +9691,7 @@
               <a:rPr lang="it-IT" sz="2800" b="1" dirty="0" smtClean="0">
                 <a:latin typeface="+mj-lt"/>
               </a:rPr>
-              <a:t> Iscrizione</a:t>
+              <a:t> Dati Personali</a:t>
             </a:r>
             <a:endParaRPr lang="it-IT" sz="2800" b="1" dirty="0" smtClean="0">
               <a:latin typeface="+mj-lt"/>
@@ -6825,7 +9707,7 @@
       </p:sp>
       <p:sp>
         <p:nvSpPr>
-          <p:cNvPr id="9" name="Content Placeholder 3"/>
+          <p:cNvPr id="4" name="Content Placeholder 3"/>
           <p:cNvSpPr txBox="1">
             <a:spLocks/>
           </p:cNvSpPr>
@@ -6833,8 +9715,8 @@
         </p:nvSpPr>
         <p:spPr>
           <a:xfrm>
-            <a:off x="251520" y="2060848"/>
-            <a:ext cx="8568952" cy="4032448"/>
+            <a:off x="539552" y="2204864"/>
+            <a:ext cx="8208912" cy="3865896"/>
           </a:xfrm>
           <a:prstGeom prst="rect">
             <a:avLst/>
@@ -7003,6 +9885,9 @@
             </a:lvl9pPr>
           </a:lstStyle>
           <a:p>
+            <a:pPr marL="0" indent="0">
+              <a:buNone/>
+            </a:pPr>
             <a:r>
               <a:rPr lang="it-IT" dirty="0" smtClean="0"/>
               <a:t>Il </a:t>
@@ -7013,11 +9898,11 @@
             </a:r>
             <a:r>
               <a:rPr lang="it-IT" b="1" dirty="0" smtClean="0"/>
-              <a:t> Iscrizione </a:t>
+              <a:t> Dati Personali </a:t>
             </a:r>
             <a:r>
               <a:rPr lang="it-IT" dirty="0" smtClean="0"/>
-              <a:t>si occupa dell’intero processo di iscrizione, dalla creazione di un account all’invio di una domanda di iscrizione. </a:t>
+              <a:t>si occupa di gestire i dati personali, dalla creazione, alla modifica, alla visualizzazione. </a:t>
             </a:r>
             <a:r>
               <a:rPr lang="it-IT" b="1" dirty="0" smtClean="0"/>
@@ -7043,6 +9928,16 @@
               <a:rPr lang="it-IT" dirty="0" smtClean="0"/>
               <a:t>, in tutta comodità. </a:t>
             </a:r>
+            <a:r>
+              <a:rPr lang="it-IT" dirty="0" smtClean="0"/>
+              <a:t> Permette inoltre, in ogni momento, di modificare i dati inseriti nella fase di iscrizione.</a:t>
+            </a:r>
+            <a:endParaRPr lang="en-US" dirty="0" smtClean="0"/>
+          </a:p>
+          <a:p>
+            <a:pPr marL="0" indent="0">
+              <a:buNone/>
+            </a:pPr>
             <a:endParaRPr lang="en-US" dirty="0"/>
           </a:p>
         </p:txBody>
@@ -7050,7 +9945,7 @@
     </p:spTree>
     <p:extLst>
       <p:ext uri="{BB962C8B-B14F-4D97-AF65-F5344CB8AC3E}">
-        <p14:creationId xmlns:p14="http://schemas.microsoft.com/office/powerpoint/2010/main" xmlns="" val="155874689"/>
+        <p14:creationId xmlns="" xmlns:p14="http://schemas.microsoft.com/office/powerpoint/2010/main" val="155874689"/>
       </p:ext>
     </p:extLst>
   </p:cSld>
@@ -7058,7 +9953,7 @@
     <a:masterClrMapping/>
   </p:clrMapOvr>
   <mc:AlternateContent xmlns:mc="http://schemas.openxmlformats.org/markup-compatibility/2006">
-    <mc:Choice xmlns:p14="http://schemas.microsoft.com/office/powerpoint/2010/main" xmlns="" Requires="p14">
+    <mc:Choice xmlns="" xmlns:p14="http://schemas.microsoft.com/office/powerpoint/2010/main" Requires="p14">
       <p:transition spd="slow" p14:dur="2000"/>
     </mc:Choice>
     <mc:Fallback>
@@ -7139,9 +10034,6 @@
               </a:rPr>
               <a:t> Iscrizione</a:t>
             </a:r>
-            <a:endParaRPr lang="it-IT" sz="2800" b="1" dirty="0" smtClean="0">
-              <a:latin typeface="+mj-lt"/>
-            </a:endParaRPr>
           </a:p>
           <a:p>
             <a:pPr algn="ctr"/>
@@ -7343,7 +10235,6 @@
               <a:rPr lang="it-IT" dirty="0" smtClean="0"/>
               <a:t>:</a:t>
             </a:r>
-            <a:endParaRPr lang="it-IT" dirty="0" smtClean="0"/>
           </a:p>
           <a:p>
             <a:pPr lvl="1"/>
@@ -7464,7 +10355,7 @@
     </p:spTree>
     <p:extLst>
       <p:ext uri="{BB962C8B-B14F-4D97-AF65-F5344CB8AC3E}">
-        <p14:creationId xmlns:p14="http://schemas.microsoft.com/office/powerpoint/2010/main" xmlns="" val="155874689"/>
+        <p14:creationId xmlns="" xmlns:p14="http://schemas.microsoft.com/office/powerpoint/2010/main" val="155874689"/>
       </p:ext>
     </p:extLst>
   </p:cSld>
@@ -7472,7 +10363,7 @@
     <a:masterClrMapping/>
   </p:clrMapOvr>
   <mc:AlternateContent xmlns:mc="http://schemas.openxmlformats.org/markup-compatibility/2006">
-    <mc:Choice xmlns:p14="http://schemas.microsoft.com/office/powerpoint/2010/main" xmlns="" Requires="p14">
+    <mc:Choice xmlns="" xmlns:p14="http://schemas.microsoft.com/office/powerpoint/2010/main" Requires="p14">
       <p:transition spd="slow" p14:dur="2000"/>
     </mc:Choice>
     <mc:Fallback>
@@ -7514,8 +10405,8 @@
         </p:nvSpPr>
         <p:spPr>
           <a:xfrm>
-            <a:off x="3058022" y="476672"/>
-            <a:ext cx="3342903" cy="1538883"/>
+            <a:off x="3011858" y="476672"/>
+            <a:ext cx="3435236" cy="1538883"/>
           </a:xfrm>
           <a:prstGeom prst="rect">
             <a:avLst/>
@@ -7533,11 +10424,14 @@
               <a:rPr lang="it-IT" sz="4800" b="1" dirty="0" err="1" smtClean="0">
                 <a:latin typeface="+mj-lt"/>
               </a:rPr>
-              <a:t>Applications</a:t>
-            </a:r>
-            <a:endParaRPr lang="it-IT" sz="4800" b="1" dirty="0" smtClean="0">
-              <a:latin typeface="+mj-lt"/>
-            </a:endParaRPr>
+              <a:t>Application</a:t>
+            </a:r>
+            <a:r>
+              <a:rPr lang="it-IT" sz="4800" b="1" dirty="0" smtClean="0">
+                <a:latin typeface="+mj-lt"/>
+              </a:rPr>
+              <a:t> </a:t>
+            </a:r>
           </a:p>
           <a:p>
             <a:pPr algn="ctr"/>
@@ -7545,13 +10439,13 @@
               <a:rPr lang="it-IT" sz="2800" b="1" dirty="0" err="1" smtClean="0">
                 <a:latin typeface="+mj-lt"/>
               </a:rPr>
-              <a:t>Step</a:t>
+              <a:t>Control</a:t>
             </a:r>
             <a:r>
               <a:rPr lang="it-IT" sz="2800" b="1" dirty="0" smtClean="0">
                 <a:latin typeface="+mj-lt"/>
               </a:rPr>
-              <a:t> Iscrizione</a:t>
+              <a:t> Dati Personali</a:t>
             </a:r>
             <a:endParaRPr lang="it-IT" sz="2800" b="1" dirty="0" smtClean="0">
               <a:latin typeface="+mj-lt"/>
@@ -7567,7 +10461,7 @@
       </p:sp>
       <p:sp>
         <p:nvSpPr>
-          <p:cNvPr id="9" name="Content Placeholder 3"/>
+          <p:cNvPr id="4" name="Content Placeholder 3"/>
           <p:cNvSpPr txBox="1">
             <a:spLocks/>
           </p:cNvSpPr>
@@ -7575,8 +10469,8 @@
         </p:nvSpPr>
         <p:spPr>
           <a:xfrm>
-            <a:off x="251520" y="1988840"/>
-            <a:ext cx="8424936" cy="4248472"/>
+            <a:off x="539552" y="2204864"/>
+            <a:ext cx="8208912" cy="3865896"/>
           </a:xfrm>
           <a:prstGeom prst="rect">
             <a:avLst/>
@@ -7745,101 +10639,51 @@
             </a:lvl9pPr>
           </a:lstStyle>
           <a:p>
-            <a:r>
-              <a:rPr lang="it-IT" dirty="0" smtClean="0"/>
-              <a:t>Solo dopo aver completato gli </a:t>
-            </a:r>
-            <a:r>
-              <a:rPr lang="it-IT" dirty="0" err="1" smtClean="0"/>
-              <a:t>step</a:t>
-            </a:r>
-            <a:r>
-              <a:rPr lang="it-IT" dirty="0" smtClean="0"/>
-              <a:t> dell’iscrizione è possibile presentare una </a:t>
-            </a:r>
-            <a:r>
-              <a:rPr lang="it-IT" b="1" dirty="0" smtClean="0"/>
-              <a:t>domanda di iscrizione,  </a:t>
-            </a:r>
-            <a:r>
-              <a:rPr lang="it-IT" dirty="0" smtClean="0"/>
-              <a:t>di un bambino all’asilo, divisa in due fasi:</a:t>
-            </a:r>
-            <a:endParaRPr lang="it-IT" dirty="0" smtClean="0"/>
-          </a:p>
-          <a:p>
-            <a:pPr lvl="1"/>
-            <a:r>
-              <a:rPr lang="it-IT" dirty="0" smtClean="0"/>
-              <a:t>La </a:t>
-            </a:r>
-            <a:r>
-              <a:rPr lang="it-IT" b="1" dirty="0" smtClean="0"/>
-              <a:t>prima fase </a:t>
-            </a:r>
-            <a:r>
-              <a:rPr lang="it-IT" dirty="0" smtClean="0"/>
-              <a:t>viene effettuata </a:t>
-            </a:r>
-            <a:r>
-              <a:rPr lang="it-IT" b="1" dirty="0" smtClean="0"/>
-              <a:t>prima</a:t>
-            </a:r>
-            <a:r>
-              <a:rPr lang="it-IT" dirty="0" smtClean="0"/>
-              <a:t> della pubblicazione delle graduatorie, quando il bando è ancora aperto</a:t>
-            </a:r>
-          </a:p>
-          <a:p>
-            <a:pPr lvl="1"/>
-            <a:r>
-              <a:rPr lang="it-IT" dirty="0" smtClean="0"/>
-              <a:t>La </a:t>
-            </a:r>
-            <a:r>
-              <a:rPr lang="it-IT" b="1" dirty="0" smtClean="0"/>
-              <a:t>seconda fase </a:t>
-            </a:r>
-            <a:r>
-              <a:rPr lang="it-IT" dirty="0" smtClean="0"/>
-              <a:t>viene effettuata </a:t>
-            </a:r>
-            <a:r>
-              <a:rPr lang="it-IT" b="1" dirty="0" smtClean="0"/>
-              <a:t>dopo</a:t>
-            </a:r>
-            <a:r>
-              <a:rPr lang="it-IT" dirty="0" smtClean="0"/>
-              <a:t> la pubblicazione delle graduatorie, per inserire i dati che servono a completare la domanda di iscrizione</a:t>
-            </a:r>
-          </a:p>
-          <a:p>
-            <a:pPr marL="0" lvl="1">
-              <a:spcBef>
-                <a:spcPts val="0"/>
-              </a:spcBef>
+            <a:pPr marL="0" indent="0">
               <a:buNone/>
             </a:pPr>
             <a:r>
               <a:rPr lang="it-IT" dirty="0" smtClean="0"/>
-              <a:t>E possibile, inoltre, conoscerne lo </a:t>
+              <a:t>Nel </a:t>
             </a:r>
             <a:r>
               <a:rPr lang="it-IT" b="1" dirty="0" smtClean="0"/>
-              <a:t>stato</a:t>
+              <a:t>rispetto della Privacy </a:t>
             </a:r>
             <a:r>
               <a:rPr lang="it-IT" dirty="0" smtClean="0"/>
-              <a:t> per avere sempre un feedback riguardo la situazione di una domanda di iscrizione</a:t>
-            </a:r>
-            <a:endParaRPr lang="it-IT" dirty="0" smtClean="0"/>
+              <a:t>ne password vengono criptate in modo che nel database non sia possibile vederle se non in forma criptata. L’algoritmo usato è l’</a:t>
+            </a:r>
+            <a:r>
+              <a:rPr lang="it-IT" b="1" dirty="0" smtClean="0"/>
+              <a:t>MD5</a:t>
+            </a:r>
+            <a:r>
+              <a:rPr lang="it-IT" dirty="0" smtClean="0"/>
+              <a:t>, che presa in input una stringa, ne restituisce un’altra di 128 bit. E’ altamente </a:t>
+            </a:r>
+            <a:r>
+              <a:rPr lang="it-IT" b="1" dirty="0" smtClean="0"/>
+              <a:t>improbabile </a:t>
+            </a:r>
+            <a:r>
+              <a:rPr lang="it-IT" dirty="0" smtClean="0"/>
+              <a:t>che con due stringe diverse si possa avere lo stesso output ed è difficile da decriptare.</a:t>
+            </a:r>
+            <a:endParaRPr lang="en-US" dirty="0" smtClean="0"/>
+          </a:p>
+          <a:p>
+            <a:pPr marL="0" indent="0">
+              <a:buNone/>
+            </a:pPr>
+            <a:endParaRPr lang="en-US" dirty="0"/>
           </a:p>
         </p:txBody>
       </p:sp>
     </p:spTree>
     <p:extLst>
       <p:ext uri="{BB962C8B-B14F-4D97-AF65-F5344CB8AC3E}">
-        <p14:creationId xmlns:p14="http://schemas.microsoft.com/office/powerpoint/2010/main" xmlns="" val="155874689"/>
+        <p14:creationId xmlns="" xmlns:p14="http://schemas.microsoft.com/office/powerpoint/2010/main" val="155874689"/>
       </p:ext>
     </p:extLst>
   </p:cSld>
@@ -7847,7 +10691,7 @@
     <a:masterClrMapping/>
   </p:clrMapOvr>
   <mc:AlternateContent xmlns:mc="http://schemas.openxmlformats.org/markup-compatibility/2006">
-    <mc:Choice xmlns:p14="http://schemas.microsoft.com/office/powerpoint/2010/main" xmlns="" Requires="p14">
+    <mc:Choice xmlns="" xmlns:p14="http://schemas.microsoft.com/office/powerpoint/2010/main" Requires="p14">
       <p:transition spd="slow" p14:dur="2000"/>
     </mc:Choice>
     <mc:Fallback>
@@ -7889,8 +10733,8 @@
         </p:nvSpPr>
         <p:spPr>
           <a:xfrm>
-            <a:off x="3058022" y="476672"/>
-            <a:ext cx="3342903" cy="1538883"/>
+            <a:off x="3110925" y="476672"/>
+            <a:ext cx="3237105" cy="1538883"/>
           </a:xfrm>
           <a:prstGeom prst="rect">
             <a:avLst/>
@@ -7908,11 +10752,14 @@
               <a:rPr lang="it-IT" sz="4800" b="1" dirty="0" err="1" smtClean="0">
                 <a:latin typeface="+mj-lt"/>
               </a:rPr>
-              <a:t>Applications</a:t>
-            </a:r>
-            <a:endParaRPr lang="it-IT" sz="4800" b="1" dirty="0" smtClean="0">
-              <a:latin typeface="+mj-lt"/>
-            </a:endParaRPr>
+              <a:t>Application</a:t>
+            </a:r>
+            <a:r>
+              <a:rPr lang="it-IT" sz="4800" b="1" dirty="0" smtClean="0">
+                <a:latin typeface="+mj-lt"/>
+              </a:rPr>
+              <a:t> </a:t>
+            </a:r>
           </a:p>
           <a:p>
             <a:pPr algn="ctr"/>
@@ -7920,7 +10767,7 @@
               <a:rPr lang="it-IT" sz="2800" b="1" dirty="0" err="1" smtClean="0">
                 <a:latin typeface="+mj-lt"/>
               </a:rPr>
-              <a:t>Step</a:t>
+              <a:t>Control</a:t>
             </a:r>
             <a:r>
               <a:rPr lang="it-IT" sz="2800" b="1" dirty="0" smtClean="0">
@@ -7928,9 +10775,6 @@
               </a:rPr>
               <a:t> Iscrizione</a:t>
             </a:r>
-            <a:endParaRPr lang="it-IT" sz="2800" b="1" dirty="0" smtClean="0">
-              <a:latin typeface="+mj-lt"/>
-            </a:endParaRPr>
           </a:p>
           <a:p>
             <a:pPr algn="ctr"/>
@@ -7942,7 +10786,7 @@
       </p:sp>
       <p:sp>
         <p:nvSpPr>
-          <p:cNvPr id="4" name="Content Placeholder 3"/>
+          <p:cNvPr id="9" name="Content Placeholder 3"/>
           <p:cNvSpPr txBox="1">
             <a:spLocks/>
           </p:cNvSpPr>
@@ -7950,8 +10794,8 @@
         </p:nvSpPr>
         <p:spPr>
           <a:xfrm>
-            <a:off x="539552" y="2348880"/>
-            <a:ext cx="8352928" cy="2880320"/>
+            <a:off x="251520" y="2060848"/>
+            <a:ext cx="8568952" cy="4032448"/>
           </a:xfrm>
           <a:prstGeom prst="rect">
             <a:avLst/>
@@ -8120,224 +10964,25 @@
             </a:lvl9pPr>
           </a:lstStyle>
           <a:p>
-            <a:pPr marL="0" indent="0">
-              <a:buNone/>
-            </a:pPr>
-            <a:r>
-              <a:rPr lang="en-US" dirty="0" smtClean="0"/>
-              <a:t>I </a:t>
-            </a:r>
-            <a:r>
-              <a:rPr lang="en-US" dirty="0" err="1" smtClean="0"/>
-              <a:t>dati</a:t>
-            </a:r>
-            <a:r>
-              <a:rPr lang="en-US" dirty="0" smtClean="0"/>
-              <a:t> </a:t>
-            </a:r>
-            <a:r>
-              <a:rPr lang="en-US" dirty="0" err="1" smtClean="0"/>
-              <a:t>relativi</a:t>
-            </a:r>
-            <a:r>
-              <a:rPr lang="en-US" dirty="0" smtClean="0"/>
-              <a:t> </a:t>
-            </a:r>
-            <a:r>
-              <a:rPr lang="en-US" dirty="0" err="1" smtClean="0"/>
-              <a:t>all’</a:t>
-            </a:r>
-            <a:r>
-              <a:rPr lang="en-US" b="1" dirty="0" err="1" smtClean="0"/>
-              <a:t>iscrizione</a:t>
-            </a:r>
-            <a:r>
-              <a:rPr lang="en-US" dirty="0" smtClean="0"/>
-              <a:t>, </a:t>
-            </a:r>
-            <a:r>
-              <a:rPr lang="en-US" dirty="0" err="1" smtClean="0"/>
-              <a:t>cioè</a:t>
-            </a:r>
-            <a:r>
-              <a:rPr lang="en-US" dirty="0" smtClean="0"/>
-              <a:t> </a:t>
-            </a:r>
-            <a:r>
-              <a:rPr lang="en-US" dirty="0" err="1" smtClean="0"/>
-              <a:t>i</a:t>
-            </a:r>
-            <a:r>
-              <a:rPr lang="en-US" dirty="0" smtClean="0"/>
-              <a:t> </a:t>
-            </a:r>
-            <a:r>
-              <a:rPr lang="en-US" dirty="0" err="1" smtClean="0"/>
-              <a:t>dati</a:t>
-            </a:r>
-            <a:r>
-              <a:rPr lang="en-US" dirty="0" smtClean="0"/>
-              <a:t> </a:t>
-            </a:r>
-            <a:r>
-              <a:rPr lang="en-US" dirty="0" err="1" smtClean="0"/>
-              <a:t>dei</a:t>
-            </a:r>
-            <a:r>
-              <a:rPr lang="en-US" dirty="0" smtClean="0"/>
-              <a:t> bambini e </a:t>
-            </a:r>
-            <a:r>
-              <a:rPr lang="en-US" dirty="0" err="1" smtClean="0"/>
-              <a:t>dei</a:t>
-            </a:r>
-            <a:r>
-              <a:rPr lang="en-US" dirty="0" smtClean="0"/>
-              <a:t> </a:t>
-            </a:r>
-            <a:r>
-              <a:rPr lang="en-US" dirty="0" err="1" smtClean="0"/>
-              <a:t>genitori</a:t>
-            </a:r>
-            <a:r>
-              <a:rPr lang="en-US" dirty="0" smtClean="0"/>
-              <a:t>, </a:t>
-            </a:r>
-            <a:r>
-              <a:rPr lang="en-US" b="1" dirty="0" err="1" smtClean="0"/>
-              <a:t>possono</a:t>
-            </a:r>
-            <a:r>
-              <a:rPr lang="en-US" b="1" dirty="0" smtClean="0"/>
-              <a:t> </a:t>
-            </a:r>
-            <a:r>
-              <a:rPr lang="en-US" b="1" dirty="0" err="1" smtClean="0"/>
-              <a:t>essere</a:t>
-            </a:r>
-            <a:r>
-              <a:rPr lang="en-US" b="1" dirty="0" smtClean="0"/>
-              <a:t> </a:t>
-            </a:r>
-            <a:r>
-              <a:rPr lang="en-US" b="1" dirty="0" err="1" smtClean="0"/>
-              <a:t>modificati</a:t>
-            </a:r>
-            <a:r>
-              <a:rPr lang="en-US" dirty="0" smtClean="0"/>
-              <a:t> in </a:t>
-            </a:r>
-            <a:r>
-              <a:rPr lang="en-US" dirty="0" err="1" smtClean="0"/>
-              <a:t>qualsiasi</a:t>
-            </a:r>
-            <a:r>
-              <a:rPr lang="en-US" dirty="0" smtClean="0"/>
-              <a:t> </a:t>
-            </a:r>
-            <a:r>
-              <a:rPr lang="en-US" dirty="0" err="1" smtClean="0"/>
-              <a:t>momento</a:t>
-            </a:r>
-            <a:r>
-              <a:rPr lang="en-US" dirty="0" smtClean="0"/>
-              <a:t>, </a:t>
-            </a:r>
-            <a:r>
-              <a:rPr lang="en-US" dirty="0" err="1" smtClean="0"/>
-              <a:t>mentre</a:t>
-            </a:r>
-            <a:r>
-              <a:rPr lang="en-US" dirty="0" smtClean="0"/>
-              <a:t> </a:t>
-            </a:r>
-            <a:r>
-              <a:rPr lang="en-US" dirty="0" err="1" smtClean="0"/>
-              <a:t>i</a:t>
-            </a:r>
-            <a:r>
-              <a:rPr lang="en-US" dirty="0" smtClean="0"/>
-              <a:t> </a:t>
-            </a:r>
-            <a:r>
-              <a:rPr lang="en-US" dirty="0" err="1" smtClean="0"/>
-              <a:t>dati</a:t>
-            </a:r>
-            <a:r>
-              <a:rPr lang="en-US" dirty="0" smtClean="0"/>
-              <a:t> per la </a:t>
-            </a:r>
-            <a:r>
-              <a:rPr lang="en-US" b="1" dirty="0" err="1" smtClean="0"/>
-              <a:t>domanda</a:t>
-            </a:r>
-            <a:r>
-              <a:rPr lang="en-US" b="1" dirty="0" smtClean="0"/>
-              <a:t> </a:t>
-            </a:r>
-            <a:r>
-              <a:rPr lang="en-US" b="1" dirty="0" err="1" smtClean="0"/>
-              <a:t>di</a:t>
-            </a:r>
-            <a:r>
-              <a:rPr lang="en-US" b="1" dirty="0" smtClean="0"/>
-              <a:t> </a:t>
-            </a:r>
-            <a:r>
-              <a:rPr lang="en-US" b="1" dirty="0" err="1" smtClean="0"/>
-              <a:t>iscrizione</a:t>
-            </a:r>
-            <a:r>
-              <a:rPr lang="en-US" b="1" dirty="0" smtClean="0"/>
-              <a:t> non </a:t>
-            </a:r>
-            <a:r>
-              <a:rPr lang="en-US" b="1" dirty="0" err="1" smtClean="0"/>
-              <a:t>possono</a:t>
-            </a:r>
-            <a:r>
-              <a:rPr lang="en-US" b="1" dirty="0" smtClean="0"/>
-              <a:t> </a:t>
-            </a:r>
-            <a:r>
-              <a:rPr lang="en-US" b="1" dirty="0" err="1" smtClean="0"/>
-              <a:t>essere</a:t>
-            </a:r>
-            <a:r>
-              <a:rPr lang="en-US" b="1" dirty="0" smtClean="0"/>
-              <a:t> </a:t>
-            </a:r>
-            <a:r>
-              <a:rPr lang="en-US" b="1" dirty="0" err="1" smtClean="0"/>
-              <a:t>modificati</a:t>
-            </a:r>
-            <a:r>
-              <a:rPr lang="en-US" b="1" dirty="0" smtClean="0"/>
-              <a:t> </a:t>
-            </a:r>
-            <a:r>
-              <a:rPr lang="en-US" dirty="0" err="1" smtClean="0"/>
-              <a:t>una</a:t>
-            </a:r>
-            <a:r>
-              <a:rPr lang="en-US" dirty="0" smtClean="0"/>
-              <a:t> </a:t>
-            </a:r>
-            <a:r>
-              <a:rPr lang="en-US" dirty="0" err="1" smtClean="0"/>
-              <a:t>volta</a:t>
-            </a:r>
-            <a:r>
-              <a:rPr lang="en-US" dirty="0" smtClean="0"/>
-              <a:t> </a:t>
-            </a:r>
-            <a:r>
-              <a:rPr lang="en-US" dirty="0" err="1" smtClean="0"/>
-              <a:t>inviati</a:t>
-            </a:r>
-            <a:r>
-              <a:rPr lang="en-US" dirty="0" smtClean="0"/>
-              <a:t>.</a:t>
+            <a:r>
+              <a:rPr lang="it-IT" dirty="0" smtClean="0"/>
+              <a:t>Il </a:t>
+            </a:r>
+            <a:r>
+              <a:rPr lang="it-IT" b="1" dirty="0" err="1" smtClean="0"/>
+              <a:t>Control</a:t>
+            </a:r>
+            <a:r>
+              <a:rPr lang="it-IT" b="1" dirty="0" smtClean="0"/>
+              <a:t> Iscrizione </a:t>
+            </a:r>
+            <a:r>
+              <a:rPr lang="it-IT" dirty="0" smtClean="0"/>
+              <a:t>si occupa </a:t>
+            </a:r>
+            <a:r>
+              <a:rPr lang="it-IT" dirty="0" smtClean="0"/>
+              <a:t>della gestione delle domanda di iscrizione presentate da un genitore per un determinato bambino in un determinato anno. Una domanda di iscrizione può essere compilata, ritirata, visualizzata, ma non modificata una volta inviata.</a:t>
             </a:r>
             <a:endParaRPr lang="en-US" dirty="0"/>
           </a:p>
@@ -8346,7 +10991,7 @@
     </p:spTree>
     <p:extLst>
       <p:ext uri="{BB962C8B-B14F-4D97-AF65-F5344CB8AC3E}">
-        <p14:creationId xmlns:p14="http://schemas.microsoft.com/office/powerpoint/2010/main" xmlns="" val="155874689"/>
+        <p14:creationId xmlns="" xmlns:p14="http://schemas.microsoft.com/office/powerpoint/2010/main" val="155874689"/>
       </p:ext>
     </p:extLst>
   </p:cSld>
@@ -8354,7 +10999,7 @@
     <a:masterClrMapping/>
   </p:clrMapOvr>
   <mc:AlternateContent xmlns:mc="http://schemas.openxmlformats.org/markup-compatibility/2006">
-    <mc:Choice xmlns:p14="http://schemas.microsoft.com/office/powerpoint/2010/main" xmlns="" Requires="p14">
+    <mc:Choice xmlns="" xmlns:p14="http://schemas.microsoft.com/office/powerpoint/2010/main" Requires="p14">
       <p:transition spd="slow" p14:dur="2000"/>
     </mc:Choice>
     <mc:Fallback>

</xml_diff>